<commit_message>
Clase 2 - Modulo 2
</commit_message>
<xml_diff>
--- a/Material pedagógico/Modulo 2/Clase 1/Clase 1 - Modulo 2.pptx
+++ b/Material pedagógico/Modulo 2/Clase 1/Clase 1 - Modulo 2.pptx
@@ -28,6 +28,7 @@
     <p:sldId id="263" r:id="rId21"/>
     <p:sldId id="264" r:id="rId22"/>
     <p:sldId id="265" r:id="rId23"/>
+    <p:sldId id="266" r:id="rId24"/>
   </p:sldIdLst>
   <p:sldSz cx="12192000" cy="6858000"/>
   <p:notesSz cx="6858000" cy="9144000"/>
@@ -358,7 +359,7 @@
             <a:pPr indent="0" algn="r">
               <a:buNone/>
             </a:pPr>
-            <a:fld id="{07F10461-A95F-481B-97FB-7DC87591EF41}" type="slidenum">
+            <a:fld id="{57DF7B41-DE90-4F5B-B4D0-CFED80A4ABC4}" type="slidenum">
               <a:rPr b="0" lang="es-CO" sz="1400" spc="-1" strike="noStrike">
                 <a:solidFill>
                   <a:srgbClr val="000000"/>
@@ -401,7 +402,7 @@
       </p:grpSpPr>
       <p:sp>
         <p:nvSpPr>
-          <p:cNvPr id="161" name="PlaceHolder 1"/>
+          <p:cNvPr id="178" name="PlaceHolder 1"/>
           <p:cNvSpPr>
             <a:spLocks noGrp="1"/>
           </p:cNvSpPr>
@@ -424,7 +425,7 @@
       </p:sp>
       <p:sp>
         <p:nvSpPr>
-          <p:cNvPr id="162" name="PlaceHolder 2"/>
+          <p:cNvPr id="179" name="PlaceHolder 2"/>
           <p:cNvSpPr>
             <a:spLocks noGrp="1"/>
           </p:cNvSpPr>
@@ -464,7 +465,7 @@
       </p:sp>
       <p:sp>
         <p:nvSpPr>
-          <p:cNvPr id="163" name="PlaceHolder 3"/>
+          <p:cNvPr id="180" name="PlaceHolder 3"/>
           <p:cNvSpPr>
             <a:spLocks noGrp="1"/>
           </p:cNvSpPr>
@@ -516,7 +517,7 @@
                 <a:tab algn="l" pos="0"/>
               </a:tabLst>
             </a:pPr>
-            <a:fld id="{621FFF99-2A5D-443A-911D-D7627739739F}" type="slidenum">
+            <a:fld id="{0DABAF05-C2E9-47B3-A14C-AB4347B725C1}" type="slidenum">
               <a:rPr b="0" lang="es-CO" sz="1400" spc="-1" strike="noStrike">
                 <a:solidFill>
                   <a:srgbClr val="000000"/>
@@ -558,7 +559,7 @@
       </p:grpSpPr>
       <p:sp>
         <p:nvSpPr>
-          <p:cNvPr id="188" name="PlaceHolder 1"/>
+          <p:cNvPr id="205" name="PlaceHolder 1"/>
           <p:cNvSpPr>
             <a:spLocks noGrp="1"/>
           </p:cNvSpPr>
@@ -581,7 +582,7 @@
       </p:sp>
       <p:sp>
         <p:nvSpPr>
-          <p:cNvPr id="189" name="PlaceHolder 2"/>
+          <p:cNvPr id="206" name="PlaceHolder 2"/>
           <p:cNvSpPr>
             <a:spLocks noGrp="1"/>
           </p:cNvSpPr>
@@ -621,7 +622,7 @@
       </p:sp>
       <p:sp>
         <p:nvSpPr>
-          <p:cNvPr id="190" name="PlaceHolder 3"/>
+          <p:cNvPr id="207" name="PlaceHolder 3"/>
           <p:cNvSpPr>
             <a:spLocks noGrp="1"/>
           </p:cNvSpPr>
@@ -673,7 +674,164 @@
                 <a:tab algn="l" pos="0"/>
               </a:tabLst>
             </a:pPr>
-            <a:fld id="{69A07975-6566-48F8-BD60-415F08D1D068}" type="slidenum">
+            <a:fld id="{5DF76063-8976-4AE0-838E-E4E3297892F8}" type="slidenum">
+              <a:rPr b="0" lang="es-CO" sz="1400" spc="-1" strike="noStrike">
+                <a:solidFill>
+                  <a:srgbClr val="000000"/>
+                </a:solidFill>
+                <a:latin typeface="Times New Roman"/>
+              </a:rPr>
+              <a:t>&lt;número&gt;</a:t>
+            </a:fld>
+            <a:endParaRPr b="0" lang="es-CO" sz="1400" spc="-1" strike="noStrike">
+              <a:solidFill>
+                <a:srgbClr val="000000"/>
+              </a:solidFill>
+              <a:latin typeface="Times New Roman"/>
+            </a:endParaRPr>
+          </a:p>
+        </p:txBody>
+      </p:sp>
+    </p:spTree>
+  </p:cSld>
+</p:notes>
+</file>
+
+<file path=ppt/notesSlides/notesSlide11.xml><?xml version="1.0" encoding="utf-8"?>
+<p:notes xmlns:a="http://schemas.openxmlformats.org/drawingml/2006/main" xmlns:p="http://schemas.openxmlformats.org/presentationml/2006/main" xmlns:r="http://schemas.openxmlformats.org/officeDocument/2006/relationships" xmlns:p14="http://schemas.microsoft.com/office/powerpoint/2010/main" xmlns:p15="http://schemas.microsoft.com/office/powerpoint/2012/main" xmlns:mc="http://schemas.openxmlformats.org/markup-compatibility/2006">
+  <p:cSld>
+    <p:spTree>
+      <p:nvGrpSpPr>
+        <p:cNvPr id="1" name=""/>
+        <p:cNvGrpSpPr/>
+        <p:nvPr/>
+      </p:nvGrpSpPr>
+      <p:grpSpPr>
+        <a:xfrm>
+          <a:off x="0" y="0"/>
+          <a:ext cx="0" cy="0"/>
+          <a:chOff x="0" y="0"/>
+          <a:chExt cx="0" cy="0"/>
+        </a:xfrm>
+      </p:grpSpPr>
+      <p:sp>
+        <p:nvSpPr>
+          <p:cNvPr id="208" name="PlaceHolder 1"/>
+          <p:cNvSpPr>
+            <a:spLocks noGrp="1"/>
+          </p:cNvSpPr>
+          <p:nvPr>
+            <p:ph type="sldImg"/>
+          </p:nvPr>
+        </p:nvSpPr>
+        <p:spPr>
+          <a:xfrm>
+            <a:off x="685800" y="1143000"/>
+            <a:ext cx="5485320" cy="3085200"/>
+          </a:xfrm>
+          <a:prstGeom prst="rect">
+            <a:avLst/>
+          </a:prstGeom>
+          <a:ln w="0">
+            <a:noFill/>
+          </a:ln>
+        </p:spPr>
+      </p:sp>
+      <p:sp>
+        <p:nvSpPr>
+          <p:cNvPr id="209" name="PlaceHolder 2"/>
+          <p:cNvSpPr>
+            <a:spLocks noGrp="1"/>
+          </p:cNvSpPr>
+          <p:nvPr>
+            <p:ph type="body"/>
+          </p:nvPr>
+        </p:nvSpPr>
+        <p:spPr>
+          <a:xfrm>
+            <a:off x="685800" y="4400640"/>
+            <a:ext cx="5485320" cy="3599640"/>
+          </a:xfrm>
+          <a:prstGeom prst="rect">
+            <a:avLst/>
+          </a:prstGeom>
+          <a:noFill/>
+          <a:ln w="0">
+            <a:noFill/>
+          </a:ln>
+        </p:spPr>
+        <p:txBody>
+          <a:bodyPr lIns="91440" rIns="91440" tIns="45720" bIns="45720" anchor="t">
+            <a:noAutofit/>
+          </a:bodyPr>
+          <a:p>
+            <a:pPr marL="216000" indent="-216000">
+              <a:buNone/>
+            </a:pPr>
+            <a:endParaRPr b="0" lang="es-CO" sz="1800" spc="-1" strike="noStrike">
+              <a:solidFill>
+                <a:srgbClr val="000000"/>
+              </a:solidFill>
+              <a:latin typeface="Arial"/>
+            </a:endParaRPr>
+          </a:p>
+        </p:txBody>
+      </p:sp>
+      <p:sp>
+        <p:nvSpPr>
+          <p:cNvPr id="210" name="PlaceHolder 3"/>
+          <p:cNvSpPr>
+            <a:spLocks noGrp="1"/>
+          </p:cNvSpPr>
+          <p:nvPr>
+            <p:ph type="sldNum" idx="47"/>
+          </p:nvPr>
+        </p:nvSpPr>
+        <p:spPr>
+          <a:xfrm>
+            <a:off x="3884760" y="8685360"/>
+            <a:ext cx="2970720" cy="457560"/>
+          </a:xfrm>
+          <a:prstGeom prst="rect">
+            <a:avLst/>
+          </a:prstGeom>
+          <a:noFill/>
+          <a:ln w="0">
+            <a:noFill/>
+          </a:ln>
+        </p:spPr>
+        <p:txBody>
+          <a:bodyPr lIns="91440" rIns="91440" tIns="45720" bIns="45720" anchor="b">
+            <a:noAutofit/>
+          </a:bodyPr>
+          <a:lstStyle>
+            <a:lvl1pPr indent="0" algn="r">
+              <a:lnSpc>
+                <a:spcPct val="100000"/>
+              </a:lnSpc>
+              <a:buNone/>
+              <a:tabLst>
+                <a:tab algn="l" pos="0"/>
+              </a:tabLst>
+              <a:defRPr b="0" lang="es-CO" sz="1400" spc="-1" strike="noStrike">
+                <a:solidFill>
+                  <a:srgbClr val="000000"/>
+                </a:solidFill>
+                <a:latin typeface="Times New Roman"/>
+              </a:defRPr>
+            </a:lvl1pPr>
+          </a:lstStyle>
+          <a:p>
+            <a:pPr indent="0" algn="r">
+              <a:lnSpc>
+                <a:spcPct val="100000"/>
+              </a:lnSpc>
+              <a:buNone/>
+              <a:tabLst>
+                <a:tab algn="l" pos="0"/>
+              </a:tabLst>
+            </a:pPr>
+            <a:fld id="{610D7CEF-12E1-487D-96EE-14DD5F91103C}" type="slidenum">
               <a:rPr b="0" lang="es-CO" sz="1400" spc="-1" strike="noStrike">
                 <a:solidFill>
                   <a:srgbClr val="000000"/>
@@ -715,7 +873,7 @@
       </p:grpSpPr>
       <p:sp>
         <p:nvSpPr>
-          <p:cNvPr id="164" name="PlaceHolder 1"/>
+          <p:cNvPr id="181" name="PlaceHolder 1"/>
           <p:cNvSpPr>
             <a:spLocks noGrp="1"/>
           </p:cNvSpPr>
@@ -738,7 +896,7 @@
       </p:sp>
       <p:sp>
         <p:nvSpPr>
-          <p:cNvPr id="165" name="PlaceHolder 2"/>
+          <p:cNvPr id="182" name="PlaceHolder 2"/>
           <p:cNvSpPr>
             <a:spLocks noGrp="1"/>
           </p:cNvSpPr>
@@ -778,7 +936,7 @@
       </p:sp>
       <p:sp>
         <p:nvSpPr>
-          <p:cNvPr id="166" name="PlaceHolder 3"/>
+          <p:cNvPr id="183" name="PlaceHolder 3"/>
           <p:cNvSpPr>
             <a:spLocks noGrp="1"/>
           </p:cNvSpPr>
@@ -830,7 +988,7 @@
                 <a:tab algn="l" pos="0"/>
               </a:tabLst>
             </a:pPr>
-            <a:fld id="{BB5B1154-85B5-4231-993B-7EF32B8C66DA}" type="slidenum">
+            <a:fld id="{7F9B781E-2A62-4CE7-9C77-D25A87D38E35}" type="slidenum">
               <a:rPr b="0" lang="es-CO" sz="1400" spc="-1" strike="noStrike">
                 <a:solidFill>
                   <a:srgbClr val="000000"/>
@@ -872,7 +1030,7 @@
       </p:grpSpPr>
       <p:sp>
         <p:nvSpPr>
-          <p:cNvPr id="167" name="PlaceHolder 1"/>
+          <p:cNvPr id="184" name="PlaceHolder 1"/>
           <p:cNvSpPr>
             <a:spLocks noGrp="1"/>
           </p:cNvSpPr>
@@ -895,7 +1053,7 @@
       </p:sp>
       <p:sp>
         <p:nvSpPr>
-          <p:cNvPr id="168" name="PlaceHolder 2"/>
+          <p:cNvPr id="185" name="PlaceHolder 2"/>
           <p:cNvSpPr>
             <a:spLocks noGrp="1"/>
           </p:cNvSpPr>
@@ -935,7 +1093,7 @@
       </p:sp>
       <p:sp>
         <p:nvSpPr>
-          <p:cNvPr id="169" name="PlaceHolder 3"/>
+          <p:cNvPr id="186" name="PlaceHolder 3"/>
           <p:cNvSpPr>
             <a:spLocks noGrp="1"/>
           </p:cNvSpPr>
@@ -987,7 +1145,7 @@
                 <a:tab algn="l" pos="0"/>
               </a:tabLst>
             </a:pPr>
-            <a:fld id="{4CB2498A-69B9-40F8-AE3F-1D547F0A81A8}" type="slidenum">
+            <a:fld id="{1D652712-F87A-4653-B808-B1E807C298EC}" type="slidenum">
               <a:rPr b="0" lang="es-CO" sz="1400" spc="-1" strike="noStrike">
                 <a:solidFill>
                   <a:srgbClr val="000000"/>
@@ -1029,7 +1187,7 @@
       </p:grpSpPr>
       <p:sp>
         <p:nvSpPr>
-          <p:cNvPr id="170" name="PlaceHolder 1"/>
+          <p:cNvPr id="187" name="PlaceHolder 1"/>
           <p:cNvSpPr>
             <a:spLocks noGrp="1"/>
           </p:cNvSpPr>
@@ -1052,7 +1210,7 @@
       </p:sp>
       <p:sp>
         <p:nvSpPr>
-          <p:cNvPr id="171" name="PlaceHolder 2"/>
+          <p:cNvPr id="188" name="PlaceHolder 2"/>
           <p:cNvSpPr>
             <a:spLocks noGrp="1"/>
           </p:cNvSpPr>
@@ -1092,7 +1250,7 @@
       </p:sp>
       <p:sp>
         <p:nvSpPr>
-          <p:cNvPr id="172" name="PlaceHolder 3"/>
+          <p:cNvPr id="189" name="PlaceHolder 3"/>
           <p:cNvSpPr>
             <a:spLocks noGrp="1"/>
           </p:cNvSpPr>
@@ -1144,7 +1302,7 @@
                 <a:tab algn="l" pos="0"/>
               </a:tabLst>
             </a:pPr>
-            <a:fld id="{01A0443E-62D9-4707-89F2-F629B0DB20FC}" type="slidenum">
+            <a:fld id="{EC041AD6-582E-425E-9C3F-200DAF196BA3}" type="slidenum">
               <a:rPr b="0" lang="es-CO" sz="1400" spc="-1" strike="noStrike">
                 <a:solidFill>
                   <a:srgbClr val="000000"/>
@@ -1186,7 +1344,7 @@
       </p:grpSpPr>
       <p:sp>
         <p:nvSpPr>
-          <p:cNvPr id="173" name="PlaceHolder 1"/>
+          <p:cNvPr id="190" name="PlaceHolder 1"/>
           <p:cNvSpPr>
             <a:spLocks noGrp="1"/>
           </p:cNvSpPr>
@@ -1209,7 +1367,7 @@
       </p:sp>
       <p:sp>
         <p:nvSpPr>
-          <p:cNvPr id="174" name="PlaceHolder 2"/>
+          <p:cNvPr id="191" name="PlaceHolder 2"/>
           <p:cNvSpPr>
             <a:spLocks noGrp="1"/>
           </p:cNvSpPr>
@@ -1249,7 +1407,7 @@
       </p:sp>
       <p:sp>
         <p:nvSpPr>
-          <p:cNvPr id="175" name="PlaceHolder 3"/>
+          <p:cNvPr id="192" name="PlaceHolder 3"/>
           <p:cNvSpPr>
             <a:spLocks noGrp="1"/>
           </p:cNvSpPr>
@@ -1301,7 +1459,7 @@
                 <a:tab algn="l" pos="0"/>
               </a:tabLst>
             </a:pPr>
-            <a:fld id="{D37D0CF4-E87B-465F-B15F-CE42C05E7169}" type="slidenum">
+            <a:fld id="{2D8D9F4D-5E67-415C-A90D-11153AF599C7}" type="slidenum">
               <a:rPr b="0" lang="es-CO" sz="1400" spc="-1" strike="noStrike">
                 <a:solidFill>
                   <a:srgbClr val="000000"/>
@@ -1343,7 +1501,7 @@
       </p:grpSpPr>
       <p:sp>
         <p:nvSpPr>
-          <p:cNvPr id="176" name="PlaceHolder 1"/>
+          <p:cNvPr id="193" name="PlaceHolder 1"/>
           <p:cNvSpPr>
             <a:spLocks noGrp="1"/>
           </p:cNvSpPr>
@@ -1366,7 +1524,7 @@
       </p:sp>
       <p:sp>
         <p:nvSpPr>
-          <p:cNvPr id="177" name="PlaceHolder 2"/>
+          <p:cNvPr id="194" name="PlaceHolder 2"/>
           <p:cNvSpPr>
             <a:spLocks noGrp="1"/>
           </p:cNvSpPr>
@@ -1406,7 +1564,7 @@
       </p:sp>
       <p:sp>
         <p:nvSpPr>
-          <p:cNvPr id="178" name="PlaceHolder 3"/>
+          <p:cNvPr id="195" name="PlaceHolder 3"/>
           <p:cNvSpPr>
             <a:spLocks noGrp="1"/>
           </p:cNvSpPr>
@@ -1458,7 +1616,7 @@
                 <a:tab algn="l" pos="0"/>
               </a:tabLst>
             </a:pPr>
-            <a:fld id="{9AE52025-614B-479C-9D03-BDFCB951D664}" type="slidenum">
+            <a:fld id="{7B92ED31-474A-416D-9287-0C5ADD3AA5AB}" type="slidenum">
               <a:rPr b="0" lang="es-CO" sz="1400" spc="-1" strike="noStrike">
                 <a:solidFill>
                   <a:srgbClr val="000000"/>
@@ -1500,7 +1658,7 @@
       </p:grpSpPr>
       <p:sp>
         <p:nvSpPr>
-          <p:cNvPr id="179" name="PlaceHolder 1"/>
+          <p:cNvPr id="196" name="PlaceHolder 1"/>
           <p:cNvSpPr>
             <a:spLocks noGrp="1"/>
           </p:cNvSpPr>
@@ -1523,7 +1681,7 @@
       </p:sp>
       <p:sp>
         <p:nvSpPr>
-          <p:cNvPr id="180" name="PlaceHolder 2"/>
+          <p:cNvPr id="197" name="PlaceHolder 2"/>
           <p:cNvSpPr>
             <a:spLocks noGrp="1"/>
           </p:cNvSpPr>
@@ -1563,7 +1721,7 @@
       </p:sp>
       <p:sp>
         <p:nvSpPr>
-          <p:cNvPr id="181" name="PlaceHolder 3"/>
+          <p:cNvPr id="198" name="PlaceHolder 3"/>
           <p:cNvSpPr>
             <a:spLocks noGrp="1"/>
           </p:cNvSpPr>
@@ -1615,7 +1773,7 @@
                 <a:tab algn="l" pos="0"/>
               </a:tabLst>
             </a:pPr>
-            <a:fld id="{96604A45-75BD-4D4F-8AFF-021CC766F50C}" type="slidenum">
+            <a:fld id="{67337724-4CB9-4781-A69C-956280418808}" type="slidenum">
               <a:rPr b="0" lang="es-CO" sz="1400" spc="-1" strike="noStrike">
                 <a:solidFill>
                   <a:srgbClr val="000000"/>
@@ -1657,7 +1815,7 @@
       </p:grpSpPr>
       <p:sp>
         <p:nvSpPr>
-          <p:cNvPr id="182" name="PlaceHolder 1"/>
+          <p:cNvPr id="199" name="PlaceHolder 1"/>
           <p:cNvSpPr>
             <a:spLocks noGrp="1"/>
           </p:cNvSpPr>
@@ -1680,7 +1838,7 @@
       </p:sp>
       <p:sp>
         <p:nvSpPr>
-          <p:cNvPr id="183" name="PlaceHolder 2"/>
+          <p:cNvPr id="200" name="PlaceHolder 2"/>
           <p:cNvSpPr>
             <a:spLocks noGrp="1"/>
           </p:cNvSpPr>
@@ -1720,7 +1878,7 @@
       </p:sp>
       <p:sp>
         <p:nvSpPr>
-          <p:cNvPr id="184" name="PlaceHolder 3"/>
+          <p:cNvPr id="201" name="PlaceHolder 3"/>
           <p:cNvSpPr>
             <a:spLocks noGrp="1"/>
           </p:cNvSpPr>
@@ -1772,7 +1930,7 @@
                 <a:tab algn="l" pos="0"/>
               </a:tabLst>
             </a:pPr>
-            <a:fld id="{3B5CC6BE-4AF2-4E50-BCD1-7137D0FED818}" type="slidenum">
+            <a:fld id="{D272727B-EAA2-418B-A3FF-F04F0FBED056}" type="slidenum">
               <a:rPr b="0" lang="es-CO" sz="1400" spc="-1" strike="noStrike">
                 <a:solidFill>
                   <a:srgbClr val="000000"/>
@@ -1814,7 +1972,7 @@
       </p:grpSpPr>
       <p:sp>
         <p:nvSpPr>
-          <p:cNvPr id="185" name="PlaceHolder 1"/>
+          <p:cNvPr id="202" name="PlaceHolder 1"/>
           <p:cNvSpPr>
             <a:spLocks noGrp="1"/>
           </p:cNvSpPr>
@@ -1837,7 +1995,7 @@
       </p:sp>
       <p:sp>
         <p:nvSpPr>
-          <p:cNvPr id="186" name="PlaceHolder 2"/>
+          <p:cNvPr id="203" name="PlaceHolder 2"/>
           <p:cNvSpPr>
             <a:spLocks noGrp="1"/>
           </p:cNvSpPr>
@@ -1877,7 +2035,7 @@
       </p:sp>
       <p:sp>
         <p:nvSpPr>
-          <p:cNvPr id="187" name="PlaceHolder 3"/>
+          <p:cNvPr id="204" name="PlaceHolder 3"/>
           <p:cNvSpPr>
             <a:spLocks noGrp="1"/>
           </p:cNvSpPr>
@@ -1929,7 +2087,7 @@
                 <a:tab algn="l" pos="0"/>
               </a:tabLst>
             </a:pPr>
-            <a:fld id="{C642908A-56C9-41EB-8381-59878EF3B8AF}" type="slidenum">
+            <a:fld id="{806E8D42-03F2-472D-9345-C50EEC9356F9}" type="slidenum">
               <a:rPr b="0" lang="es-CO" sz="1400" spc="-1" strike="noStrike">
                 <a:solidFill>
                   <a:srgbClr val="000000"/>
@@ -2003,7 +2161,7 @@
         <p:txBody>
           <a:bodyPr/>
           <a:p>
-            <a:fld id="{FF905054-F120-482B-AC93-C46B1979F8A6}" type="slidenum">
+            <a:fld id="{8993EF01-9608-4900-A41B-34593B83B9B4}" type="slidenum">
               <a:t>&lt;#&gt;</a:t>
             </a:fld>
           </a:p>
@@ -2086,7 +2244,7 @@
         <p:txBody>
           <a:bodyPr/>
           <a:p>
-            <a:fld id="{3AD64009-723F-4B16-BF8D-F498933F9646}" type="slidenum">
+            <a:fld id="{F66F502A-211A-4E2C-926E-CD3D5444C15D}" type="slidenum">
               <a:t>&lt;#&gt;</a:t>
             </a:fld>
           </a:p>
@@ -2169,7 +2327,7 @@
         <p:txBody>
           <a:bodyPr/>
           <a:p>
-            <a:fld id="{CB97D0E7-883F-40F8-B411-B437B4D2130C}" type="slidenum">
+            <a:fld id="{F2F57C31-1622-44C2-8161-611455DBFFB4}" type="slidenum">
               <a:t>&lt;#&gt;</a:t>
             </a:fld>
           </a:p>
@@ -2252,7 +2410,7 @@
         <p:txBody>
           <a:bodyPr/>
           <a:p>
-            <a:fld id="{D9075756-C431-45B9-824A-C34BC5255C9B}" type="slidenum">
+            <a:fld id="{B5E3851E-1298-4A4B-866F-6AD38F82831E}" type="slidenum">
               <a:t>&lt;#&gt;</a:t>
             </a:fld>
           </a:p>
@@ -2335,7 +2493,7 @@
         <p:txBody>
           <a:bodyPr/>
           <a:p>
-            <a:fld id="{EB73A1ED-A35E-4484-9858-F0894F612167}" type="slidenum">
+            <a:fld id="{26F6425E-79E7-41CD-90D8-8D7F820A7AA8}" type="slidenum">
               <a:t>&lt;#&gt;</a:t>
             </a:fld>
           </a:p>
@@ -2498,7 +2656,7 @@
         <p:txBody>
           <a:bodyPr/>
           <a:p>
-            <a:fld id="{59E0E92B-3B42-4904-87C5-0C27608C33D2}" type="slidenum">
+            <a:fld id="{87ED350A-E1E1-4604-B31A-4F7B2446CBA9}" type="slidenum">
               <a:t>&lt;#&gt;</a:t>
             </a:fld>
           </a:p>
@@ -2664,7 +2822,7 @@
         <p:txBody>
           <a:bodyPr/>
           <a:p>
-            <a:fld id="{891584CC-C64B-42D2-B822-FD78E51158DD}" type="slidenum">
+            <a:fld id="{F4503CDC-5541-44A8-8383-D3B4EEB0E859}" type="slidenum">
               <a:t>&lt;#&gt;</a:t>
             </a:fld>
           </a:p>
@@ -2747,7 +2905,7 @@
         <p:txBody>
           <a:bodyPr/>
           <a:p>
-            <a:fld id="{13DA8F28-32E3-4089-9AA8-242D7F364ADA}" type="slidenum">
+            <a:fld id="{E47B7DCB-7ECA-48E4-AE49-2821785C0D59}" type="slidenum">
               <a:t>&lt;#&gt;</a:t>
             </a:fld>
           </a:p>
@@ -2956,7 +3114,7 @@
         <p:txBody>
           <a:bodyPr/>
           <a:p>
-            <a:fld id="{DABD3478-8ACD-46C2-B9DC-6BE7B4C02673}" type="slidenum">
+            <a:fld id="{83D5FC4B-1EFA-4B6D-AF42-3E779F660759}" type="slidenum">
               <a:t>&lt;#&gt;</a:t>
             </a:fld>
           </a:p>
@@ -3039,7 +3197,7 @@
         <p:txBody>
           <a:bodyPr/>
           <a:p>
-            <a:fld id="{E04D2B9F-3883-4AD2-AF38-79402663419A}" type="slidenum">
+            <a:fld id="{3023625F-BC69-4554-A466-4C7B56A4E020}" type="slidenum">
               <a:t>&lt;#&gt;</a:t>
             </a:fld>
           </a:p>
@@ -3162,7 +3320,7 @@
         <p:txBody>
           <a:bodyPr/>
           <a:p>
-            <a:fld id="{6DC79D80-6CE6-4424-BF60-786AD9573E7F}" type="slidenum">
+            <a:fld id="{5E5BF2AF-6180-4DF1-A05F-F40D55EF40F3}" type="slidenum">
               <a:t>&lt;#&gt;</a:t>
             </a:fld>
           </a:p>
@@ -3279,7 +3437,7 @@
                 </a:solidFill>
                 <a:latin typeface="Times New Roman"/>
               </a:rPr>
-              <a:t>&lt;pie de página&gt;</a:t>
+              <a:t> </a:t>
             </a:r>
             <a:endParaRPr b="0" lang="es-CO" sz="1400" spc="-1" strike="noStrike">
               <a:solidFill>
@@ -3345,7 +3503,7 @@
                 <a:tab algn="l" pos="0"/>
               </a:tabLst>
             </a:pPr>
-            <a:fld id="{95FEA04E-9D92-41F3-BC38-8634385E5EEA}" type="slidenum">
+            <a:fld id="{C991C93C-24B6-48CE-A514-98CB3F4BCD04}" type="slidenum">
               <a:rPr b="0" lang="es-CO" sz="1200" spc="-1" strike="noStrike">
                 <a:solidFill>
                   <a:srgbClr val="888888"/>
@@ -3353,7 +3511,7 @@
                 <a:latin typeface="Calibri"/>
                 <a:ea typeface="Calibri"/>
               </a:rPr>
-              <a:t>&lt;número&gt;</a:t>
+              <a:t>5</a:t>
             </a:fld>
             <a:endParaRPr b="0" lang="es-CO" sz="1200" spc="-1" strike="noStrike">
               <a:solidFill>
@@ -3413,7 +3571,7 @@
                 </a:solidFill>
                 <a:latin typeface="Times New Roman"/>
               </a:rPr>
-              <a:t>&lt;fecha/hora&gt;</a:t>
+              <a:t> </a:t>
             </a:r>
             <a:endParaRPr b="0" lang="es-CO" sz="1400" spc="-1" strike="noStrike">
               <a:solidFill>
@@ -3858,7 +4016,7 @@
                 <a:tab algn="l" pos="0"/>
               </a:tabLst>
             </a:pPr>
-            <a:fld id="{7776F2B6-9CDC-4C70-8576-B52BBCB44899}" type="slidenum">
+            <a:fld id="{B89DE66E-3746-4B3D-8C2D-E9ACC21A67A6}" type="slidenum">
               <a:rPr b="0" lang="es-CO" sz="1200" spc="-1" strike="noStrike">
                 <a:solidFill>
                   <a:srgbClr val="888888"/>
@@ -4097,7 +4255,7 @@
                 <a:tab algn="l" pos="0"/>
               </a:tabLst>
             </a:pPr>
-            <a:fld id="{63C4F108-A3AD-42DD-A1F6-2F5DD509D8E9}" type="slidenum">
+            <a:fld id="{B5612DD2-8552-472E-87D7-3F2FFAB1AF53}" type="slidenum">
               <a:rPr b="0" lang="es-CO" sz="1200" spc="-1" strike="noStrike">
                 <a:solidFill>
                   <a:srgbClr val="888888"/>
@@ -4336,7 +4494,7 @@
                 <a:tab algn="l" pos="0"/>
               </a:tabLst>
             </a:pPr>
-            <a:fld id="{5B3485DB-AD95-4841-84FA-779F15CC3447}" type="slidenum">
+            <a:fld id="{A1FC82FA-E681-4BC0-AFB5-86B4F61D7076}" type="slidenum">
               <a:rPr b="0" lang="es-CO" sz="1200" spc="-1" strike="noStrike">
                 <a:solidFill>
                   <a:srgbClr val="888888"/>
@@ -4575,7 +4733,7 @@
                 <a:tab algn="l" pos="0"/>
               </a:tabLst>
             </a:pPr>
-            <a:fld id="{5741FDE7-D66F-4D7A-980A-8671C2B53543}" type="slidenum">
+            <a:fld id="{A8E59B3F-418F-4A09-8B5E-973BDC8BC40B}" type="slidenum">
               <a:rPr b="0" lang="es-CO" sz="1200" spc="-1" strike="noStrike">
                 <a:solidFill>
                   <a:srgbClr val="888888"/>
@@ -4863,7 +5021,7 @@
                 <a:tab algn="l" pos="0"/>
               </a:tabLst>
             </a:pPr>
-            <a:fld id="{ED1D1BB8-F43A-4665-9D84-DF69964903FE}" type="slidenum">
+            <a:fld id="{94D635D1-C794-4FF3-B431-C5C5BCF1CFA8}" type="slidenum">
               <a:rPr b="0" lang="es-CO" sz="1200" spc="-1" strike="noStrike">
                 <a:solidFill>
                   <a:srgbClr val="888888"/>
@@ -5376,7 +5534,7 @@
                 <a:tab algn="l" pos="0"/>
               </a:tabLst>
             </a:pPr>
-            <a:fld id="{0EB18637-25BA-4F6A-B008-6F0DC0C815F7}" type="slidenum">
+            <a:fld id="{F1107CC5-B637-4E53-80D0-7782F573F7CA}" type="slidenum">
               <a:rPr b="0" lang="es-CO" sz="1200" spc="-1" strike="noStrike">
                 <a:solidFill>
                   <a:srgbClr val="888888"/>
@@ -5615,7 +5773,7 @@
                 <a:tab algn="l" pos="0"/>
               </a:tabLst>
             </a:pPr>
-            <a:fld id="{074E00C8-9DBD-4788-A51D-71188B823CEA}" type="slidenum">
+            <a:fld id="{4E44F962-3AC3-4E65-A590-F913934F94E3}" type="slidenum">
               <a:rPr b="0" lang="es-CO" sz="1200" spc="-1" strike="noStrike">
                 <a:solidFill>
                   <a:srgbClr val="888888"/>
@@ -6353,7 +6511,7 @@
                 <a:tab algn="l" pos="0"/>
               </a:tabLst>
             </a:pPr>
-            <a:fld id="{E986285C-7BD7-4D85-9AA1-B64E4801F7A4}" type="slidenum">
+            <a:fld id="{94E4934E-93E1-41A0-BC8A-45936C60B35A}" type="slidenum">
               <a:rPr b="0" lang="es-CO" sz="1200" spc="-1" strike="noStrike">
                 <a:solidFill>
                   <a:srgbClr val="888888"/>
@@ -6592,7 +6750,7 @@
                 <a:tab algn="l" pos="0"/>
               </a:tabLst>
             </a:pPr>
-            <a:fld id="{01D90627-5024-41FA-BBFF-AFA71AE6DD43}" type="slidenum">
+            <a:fld id="{65811042-FCBB-4B13-BC7A-8F78BA6EFC8B}" type="slidenum">
               <a:rPr b="0" lang="es-CO" sz="1200" spc="-1" strike="noStrike">
                 <a:solidFill>
                   <a:srgbClr val="888888"/>
@@ -6880,7 +7038,7 @@
                 <a:tab algn="l" pos="0"/>
               </a:tabLst>
             </a:pPr>
-            <a:fld id="{29B7E5DF-60F1-4CC4-8501-B3C20AA0F119}" type="slidenum">
+            <a:fld id="{EFD6984E-61EC-48E4-8A50-CBEA75ECE032}" type="slidenum">
               <a:rPr b="0" lang="es-CO" sz="1200" spc="-1" strike="noStrike">
                 <a:solidFill>
                   <a:srgbClr val="888888"/>
@@ -7417,9 +7575,235 @@
           <a:chExt cx="0" cy="0"/>
         </a:xfrm>
       </p:grpSpPr>
+      <p:pic>
+        <p:nvPicPr>
+          <p:cNvPr id="162" name="Google Shape;311;g1f213c8c16b_0_211" descr=""/>
+          <p:cNvPicPr/>
+          <p:nvPr/>
+        </p:nvPicPr>
+        <p:blipFill>
+          <a:blip r:embed="rId1"/>
+          <a:stretch/>
+        </p:blipFill>
+        <p:spPr>
+          <a:xfrm>
+            <a:off x="3965040" y="4641120"/>
+            <a:ext cx="4088880" cy="1336320"/>
+          </a:xfrm>
+          <a:prstGeom prst="rect">
+            <a:avLst/>
+          </a:prstGeom>
+          <a:ln w="0">
+            <a:noFill/>
+          </a:ln>
+        </p:spPr>
+      </p:pic>
+      <p:sp>
+        <p:nvSpPr>
+          <p:cNvPr id="163" name="Google Shape;312;g1f213c8c16b_0_211"/>
+          <p:cNvSpPr/>
+          <p:nvPr/>
+        </p:nvSpPr>
+        <p:spPr>
+          <a:xfrm>
+            <a:off x="1228680" y="585000"/>
+            <a:ext cx="9565560" cy="1186920"/>
+          </a:xfrm>
+          <a:prstGeom prst="rect">
+            <a:avLst/>
+          </a:prstGeom>
+          <a:noFill/>
+          <a:ln w="0">
+            <a:noFill/>
+          </a:ln>
+        </p:spPr>
+        <p:style>
+          <a:lnRef idx="0"/>
+          <a:fillRef idx="0"/>
+          <a:effectRef idx="0"/>
+          <a:fontRef idx="minor"/>
+        </p:style>
+        <p:txBody>
+          <a:bodyPr lIns="90000" rIns="90000" tIns="45000" bIns="45000" anchor="t">
+            <a:spAutoFit/>
+          </a:bodyPr>
+          <a:p>
+            <a:pPr algn="ctr">
+              <a:lnSpc>
+                <a:spcPct val="100000"/>
+              </a:lnSpc>
+              <a:tabLst>
+                <a:tab algn="l" pos="0"/>
+              </a:tabLst>
+            </a:pPr>
+            <a:r>
+              <a:rPr b="0" lang="es-CO" sz="7200" spc="-1" strike="noStrike">
+                <a:solidFill>
+                  <a:srgbClr val="001059"/>
+                </a:solidFill>
+                <a:latin typeface="Nunito Sans Black"/>
+                <a:ea typeface="Nunito Sans Black"/>
+              </a:rPr>
+              <a:t>LOGOS:</a:t>
+            </a:r>
+            <a:endParaRPr b="0" lang="es-CO" sz="7200" spc="-1" strike="noStrike">
+              <a:solidFill>
+                <a:srgbClr val="000000"/>
+              </a:solidFill>
+              <a:latin typeface="Arial"/>
+            </a:endParaRPr>
+          </a:p>
+        </p:txBody>
+      </p:sp>
+      <p:pic>
+        <p:nvPicPr>
+          <p:cNvPr id="164" name="Google Shape;313;g1f213c8c16b_0_211" descr=""/>
+          <p:cNvPicPr/>
+          <p:nvPr/>
+        </p:nvPicPr>
+        <p:blipFill>
+          <a:blip r:embed="rId2"/>
+          <a:srcRect l="8004" t="20494" r="6931" b="16482"/>
+          <a:stretch/>
+        </p:blipFill>
+        <p:spPr>
+          <a:xfrm>
+            <a:off x="4869360" y="2808000"/>
+            <a:ext cx="2451960" cy="870480"/>
+          </a:xfrm>
+          <a:prstGeom prst="rect">
+            <a:avLst/>
+          </a:prstGeom>
+          <a:ln w="0">
+            <a:noFill/>
+          </a:ln>
+        </p:spPr>
+      </p:pic>
+      <p:pic>
+        <p:nvPicPr>
+          <p:cNvPr id="165" name="Google Shape;314;g1f213c8c16b_0_211" descr=""/>
+          <p:cNvPicPr/>
+          <p:nvPr/>
+        </p:nvPicPr>
+        <p:blipFill>
+          <a:blip r:embed="rId3"/>
+          <a:stretch/>
+        </p:blipFill>
+        <p:spPr>
+          <a:xfrm>
+            <a:off x="1228680" y="2808000"/>
+            <a:ext cx="1854000" cy="645480"/>
+          </a:xfrm>
+          <a:prstGeom prst="rect">
+            <a:avLst/>
+          </a:prstGeom>
+          <a:ln w="0">
+            <a:noFill/>
+          </a:ln>
+        </p:spPr>
+      </p:pic>
+      <p:pic>
+        <p:nvPicPr>
+          <p:cNvPr id="166" name="Google Shape;315;g1f213c8c16b_0_211" descr=""/>
+          <p:cNvPicPr/>
+          <p:nvPr/>
+        </p:nvPicPr>
+        <p:blipFill>
+          <a:blip r:embed="rId4"/>
+          <a:stretch/>
+        </p:blipFill>
+        <p:spPr>
+          <a:xfrm>
+            <a:off x="8579880" y="2695680"/>
+            <a:ext cx="2026440" cy="1095480"/>
+          </a:xfrm>
+          <a:prstGeom prst="rect">
+            <a:avLst/>
+          </a:prstGeom>
+          <a:ln w="0">
+            <a:noFill/>
+          </a:ln>
+        </p:spPr>
+      </p:pic>
+      <p:pic>
+        <p:nvPicPr>
+          <p:cNvPr id="167" name="Google Shape;316;g1f213c8c16b_0_211" descr=""/>
+          <p:cNvPicPr/>
+          <p:nvPr/>
+        </p:nvPicPr>
+        <p:blipFill>
+          <a:blip r:embed="rId5"/>
+          <a:stretch/>
+        </p:blipFill>
+        <p:spPr>
+          <a:xfrm>
+            <a:off x="597600" y="398520"/>
+            <a:ext cx="1086840" cy="378360"/>
+          </a:xfrm>
+          <a:prstGeom prst="rect">
+            <a:avLst/>
+          </a:prstGeom>
+          <a:ln w="0">
+            <a:noFill/>
+          </a:ln>
+        </p:spPr>
+      </p:pic>
+      <p:pic>
+        <p:nvPicPr>
+          <p:cNvPr id="168" name="Google Shape;317;g1f213c8c16b_0_211" descr=""/>
+          <p:cNvPicPr/>
+          <p:nvPr/>
+        </p:nvPicPr>
+        <p:blipFill>
+          <a:blip r:embed="rId6"/>
+          <a:stretch/>
+        </p:blipFill>
+        <p:spPr>
+          <a:xfrm>
+            <a:off x="10002240" y="199800"/>
+            <a:ext cx="1423080" cy="768960"/>
+          </a:xfrm>
+          <a:prstGeom prst="rect">
+            <a:avLst/>
+          </a:prstGeom>
+          <a:ln w="0">
+            <a:noFill/>
+          </a:ln>
+        </p:spPr>
+      </p:pic>
+    </p:spTree>
+  </p:cSld>
+  <mc:AlternateContent>
+    <mc:Choice Requires="p14">
+      <p:transition spd="slow" p14:dur="2000"/>
+    </mc:Choice>
+    <mc:Fallback>
+      <p:transition spd="slow"/>
+    </mc:Fallback>
+  </mc:AlternateContent>
+</p:sld>
+</file>
+
+<file path=ppt/slides/slide11.xml><?xml version="1.0" encoding="utf-8"?>
+<p:sld xmlns:a="http://schemas.openxmlformats.org/drawingml/2006/main" xmlns:p="http://schemas.openxmlformats.org/presentationml/2006/main" xmlns:r="http://schemas.openxmlformats.org/officeDocument/2006/relationships" xmlns:p14="http://schemas.microsoft.com/office/powerpoint/2010/main" xmlns:p15="http://schemas.microsoft.com/office/powerpoint/2012/main" xmlns:mc="http://schemas.openxmlformats.org/markup-compatibility/2006">
+  <p:cSld>
+    <p:spTree>
+      <p:nvGrpSpPr>
+        <p:cNvPr id="1" name=""/>
+        <p:cNvGrpSpPr/>
+        <p:nvPr/>
+      </p:nvGrpSpPr>
+      <p:grpSpPr>
+        <a:xfrm>
+          <a:off x="0" y="0"/>
+          <a:ext cx="0" cy="0"/>
+          <a:chOff x="0" y="0"/>
+          <a:chExt cx="0" cy="0"/>
+        </a:xfrm>
+      </p:grpSpPr>
       <p:grpSp>
         <p:nvGrpSpPr>
-          <p:cNvPr id="152" name="Google Shape;323;g1f213c8c16b_0_222"/>
+          <p:cNvPr id="169" name="Google Shape;323;g1f213c8c16b_0_222"/>
           <p:cNvGrpSpPr/>
           <p:nvPr/>
         </p:nvGrpSpPr>
@@ -7433,7 +7817,7 @@
         </p:grpSpPr>
         <p:pic>
           <p:nvPicPr>
-            <p:cNvPr id="153" name="Google Shape;324;g1f213c8c16b_0_222" descr=""/>
+            <p:cNvPr id="170" name="Google Shape;324;g1f213c8c16b_0_222" descr=""/>
             <p:cNvPicPr/>
             <p:nvPr/>
           </p:nvPicPr>
@@ -7457,7 +7841,7 @@
         </p:pic>
         <p:pic>
           <p:nvPicPr>
-            <p:cNvPr id="154" name="Google Shape;325;g1f213c8c16b_0_222" descr=""/>
+            <p:cNvPr id="171" name="Google Shape;325;g1f213c8c16b_0_222" descr=""/>
             <p:cNvPicPr/>
             <p:nvPr/>
           </p:nvPicPr>
@@ -7481,7 +7865,7 @@
       </p:grpSp>
       <p:pic>
         <p:nvPicPr>
-          <p:cNvPr id="155" name="Google Shape;326;g1f213c8c16b_0_222" descr=""/>
+          <p:cNvPr id="172" name="Google Shape;326;g1f213c8c16b_0_222" descr=""/>
           <p:cNvPicPr/>
           <p:nvPr/>
         </p:nvPicPr>
@@ -7504,7 +7888,7 @@
       </p:pic>
       <p:pic>
         <p:nvPicPr>
-          <p:cNvPr id="156" name="Google Shape;327;g1f213c8c16b_0_222" descr=""/>
+          <p:cNvPr id="173" name="Google Shape;327;g1f213c8c16b_0_222" descr=""/>
           <p:cNvPicPr/>
           <p:nvPr/>
         </p:nvPicPr>
@@ -7527,7 +7911,7 @@
       </p:pic>
       <p:pic>
         <p:nvPicPr>
-          <p:cNvPr id="157" name="Google Shape;328;g1f213c8c16b_0_222" descr=""/>
+          <p:cNvPr id="174" name="Google Shape;328;g1f213c8c16b_0_222" descr=""/>
           <p:cNvPicPr/>
           <p:nvPr/>
         </p:nvPicPr>
@@ -7550,7 +7934,7 @@
       </p:pic>
       <p:grpSp>
         <p:nvGrpSpPr>
-          <p:cNvPr id="158" name="Google Shape;329;g1f213c8c16b_0_222"/>
+          <p:cNvPr id="175" name="Google Shape;329;g1f213c8c16b_0_222"/>
           <p:cNvGrpSpPr/>
           <p:nvPr/>
         </p:nvGrpSpPr>
@@ -7564,7 +7948,7 @@
         </p:grpSpPr>
         <p:pic>
           <p:nvPicPr>
-            <p:cNvPr id="159" name="Google Shape;330;g1f213c8c16b_0_222" descr=""/>
+            <p:cNvPr id="176" name="Google Shape;330;g1f213c8c16b_0_222" descr=""/>
             <p:cNvPicPr/>
             <p:nvPr/>
           </p:nvPicPr>
@@ -7587,7 +7971,7 @@
         </p:pic>
         <p:pic>
           <p:nvPicPr>
-            <p:cNvPr id="160" name="Google Shape;331;g1f213c8c16b_0_222" descr=""/>
+            <p:cNvPr id="177" name="Google Shape;331;g1f213c8c16b_0_222" descr=""/>
             <p:cNvPicPr/>
             <p:nvPr/>
           </p:nvPicPr>
@@ -8808,8 +9192,54 @@
         </p:blipFill>
         <p:spPr>
           <a:xfrm>
-            <a:off x="2163960" y="2340000"/>
-            <a:ext cx="8096040" cy="3876480"/>
+            <a:off x="363960" y="2243520"/>
+            <a:ext cx="6968160" cy="3336480"/>
+          </a:xfrm>
+          <a:prstGeom prst="rect">
+            <a:avLst/>
+          </a:prstGeom>
+          <a:ln w="0">
+            <a:noFill/>
+          </a:ln>
+        </p:spPr>
+      </p:pic>
+      <p:pic>
+        <p:nvPicPr>
+          <p:cNvPr id="98" name="" descr=""/>
+          <p:cNvPicPr/>
+          <p:nvPr/>
+        </p:nvPicPr>
+        <p:blipFill>
+          <a:blip r:embed="rId7"/>
+          <a:stretch/>
+        </p:blipFill>
+        <p:spPr>
+          <a:xfrm>
+            <a:off x="7740000" y="1986480"/>
+            <a:ext cx="3756240" cy="2333520"/>
+          </a:xfrm>
+          <a:prstGeom prst="rect">
+            <a:avLst/>
+          </a:prstGeom>
+          <a:ln w="0">
+            <a:noFill/>
+          </a:ln>
+        </p:spPr>
+      </p:pic>
+      <p:pic>
+        <p:nvPicPr>
+          <p:cNvPr id="99" name="" descr=""/>
+          <p:cNvPicPr/>
+          <p:nvPr/>
+        </p:nvPicPr>
+        <p:blipFill>
+          <a:blip r:embed="rId8"/>
+          <a:stretch/>
+        </p:blipFill>
+        <p:spPr>
+          <a:xfrm>
+            <a:off x="7740000" y="4680000"/>
+            <a:ext cx="3600000" cy="1897920"/>
           </a:xfrm>
           <a:prstGeom prst="rect">
             <a:avLst/>
@@ -8851,21 +9281,21 @@
       </p:grpSpPr>
       <p:grpSp>
         <p:nvGrpSpPr>
-          <p:cNvPr id="98" name="Google Shape;266;g1f213c8c16b_0_ 1"/>
+          <p:cNvPr id="100" name="Google Shape;266;g1f213c8c16b_0_ 7"/>
           <p:cNvGrpSpPr/>
           <p:nvPr/>
         </p:nvGrpSpPr>
         <p:grpSpPr>
           <a:xfrm>
-            <a:off x="360" y="-17640"/>
+            <a:off x="0" y="0"/>
             <a:ext cx="12191040" cy="6856920"/>
-            <a:chOff x="360" y="-17640"/>
+            <a:chOff x="0" y="0"/>
             <a:chExt cx="12191040" cy="6856920"/>
           </a:xfrm>
         </p:grpSpPr>
         <p:pic>
           <p:nvPicPr>
-            <p:cNvPr id="99" name="Google Shape;267;g1f213c8c16b_0_ 1" descr=""/>
+            <p:cNvPr id="101" name="Google Shape;267;g1f213c8c16b_0_ 7" descr=""/>
             <p:cNvPicPr/>
             <p:nvPr/>
           </p:nvPicPr>
@@ -8876,7 +9306,7 @@
           </p:blipFill>
           <p:spPr>
             <a:xfrm>
-              <a:off x="360" y="-17640"/>
+              <a:off x="0" y="0"/>
               <a:ext cx="12191040" cy="6856920"/>
             </a:xfrm>
             <a:prstGeom prst="rect">
@@ -8889,7 +9319,7 @@
         </p:pic>
         <p:pic>
           <p:nvPicPr>
-            <p:cNvPr id="100" name="Google Shape;268;g1f213c8c16b_0_ 1" descr=""/>
+            <p:cNvPr id="102" name="Google Shape;268;g1f213c8c16b_0_ 7" descr=""/>
             <p:cNvPicPr/>
             <p:nvPr/>
           </p:nvPicPr>
@@ -8899,7 +9329,7 @@
           </p:blipFill>
           <p:spPr>
             <a:xfrm>
-              <a:off x="360" y="-17640"/>
+              <a:off x="0" y="0"/>
               <a:ext cx="12191040" cy="6856920"/>
             </a:xfrm>
             <a:prstGeom prst="rect">
@@ -8913,7 +9343,7 @@
       </p:grpSp>
       <p:pic>
         <p:nvPicPr>
-          <p:cNvPr id="101" name="Google Shape;269;g1f213c8c16b_0_ 1" descr=""/>
+          <p:cNvPr id="103" name="Google Shape;269;g1f213c8c16b_0_ 7" descr=""/>
           <p:cNvPicPr/>
           <p:nvPr/>
         </p:nvPicPr>
@@ -8936,7 +9366,7 @@
       </p:pic>
       <p:grpSp>
         <p:nvGrpSpPr>
-          <p:cNvPr id="102" name="Google Shape;287;g1f213c8c16b_0_ 1"/>
+          <p:cNvPr id="104" name="Google Shape;287;g1f213c8c16b_0_ 7"/>
           <p:cNvGrpSpPr/>
           <p:nvPr/>
         </p:nvGrpSpPr>
@@ -8950,7 +9380,7 @@
         </p:grpSpPr>
         <p:pic>
           <p:nvPicPr>
-            <p:cNvPr id="103" name="Google Shape;288;g1f213c8c16b_0_ 1" descr=""/>
+            <p:cNvPr id="105" name="Google Shape;288;g1f213c8c16b_0_ 7" descr=""/>
             <p:cNvPicPr/>
             <p:nvPr/>
           </p:nvPicPr>
@@ -8973,7 +9403,7 @@
         </p:pic>
         <p:pic>
           <p:nvPicPr>
-            <p:cNvPr id="104" name="Google Shape;289;g1f213c8c16b_0_ 1" descr=""/>
+            <p:cNvPr id="106" name="Google Shape;289;g1f213c8c16b_0_ 7" descr=""/>
             <p:cNvPicPr/>
             <p:nvPr/>
           </p:nvPicPr>
@@ -8997,7 +9427,7 @@
       </p:grpSp>
       <p:sp>
         <p:nvSpPr>
-          <p:cNvPr id="105" name="Google Shape;253;g1f213c8c16b_0_ 1"/>
+          <p:cNvPr id="107" name="Google Shape;253;g1f213c8c16b_0_ 7"/>
           <p:cNvSpPr/>
           <p:nvPr/>
         </p:nvSpPr>
@@ -9025,7 +9455,7 @@
             <a:spAutoFit/>
           </a:bodyPr>
           <a:p>
-            <a:pPr algn="ctr">
+            <a:pPr>
               <a:lnSpc>
                 <a:spcPct val="100000"/>
               </a:lnSpc>
@@ -9047,7 +9477,7 @@
                 <a:latin typeface="Nunito Sans Black"/>
                 <a:ea typeface="Nunito Sans Black"/>
               </a:rPr>
-              <a:t>Arreglos</a:t>
+              <a:t>Estructuras especializadas</a:t>
             </a:r>
             <a:endParaRPr b="0" lang="es-CO" sz="3600" spc="-1" strike="noStrike">
               <a:solidFill>
@@ -9060,7 +9490,7 @@
       </p:sp>
       <p:pic>
         <p:nvPicPr>
-          <p:cNvPr id="106" name="" descr=""/>
+          <p:cNvPr id="108" name="" descr=""/>
           <p:cNvPicPr/>
           <p:nvPr/>
         </p:nvPicPr>
@@ -9070,8 +9500,78 @@
         </p:blipFill>
         <p:spPr>
           <a:xfrm>
-            <a:off x="3600000" y="1826280"/>
-            <a:ext cx="5543280" cy="4833720"/>
+            <a:off x="5580000" y="1800000"/>
+            <a:ext cx="5143680" cy="1800000"/>
+          </a:xfrm>
+          <a:prstGeom prst="rect">
+            <a:avLst/>
+          </a:prstGeom>
+          <a:ln w="0">
+            <a:noFill/>
+          </a:ln>
+        </p:spPr>
+      </p:pic>
+      <p:pic>
+        <p:nvPicPr>
+          <p:cNvPr id="109" name="" descr=""/>
+          <p:cNvPicPr/>
+          <p:nvPr/>
+        </p:nvPicPr>
+        <p:blipFill>
+          <a:blip r:embed="rId7"/>
+          <a:stretch/>
+        </p:blipFill>
+        <p:spPr>
+          <a:xfrm>
+            <a:off x="196560" y="2126160"/>
+            <a:ext cx="5203440" cy="2913840"/>
+          </a:xfrm>
+          <a:prstGeom prst="rect">
+            <a:avLst/>
+          </a:prstGeom>
+          <a:ln w="0">
+            <a:noFill/>
+          </a:ln>
+        </p:spPr>
+      </p:pic>
+      <p:pic>
+        <p:nvPicPr>
+          <p:cNvPr id="110" name="" descr=""/>
+          <p:cNvPicPr/>
+          <p:nvPr/>
+        </p:nvPicPr>
+        <p:blipFill>
+          <a:blip r:embed="rId8"/>
+          <a:srcRect l="0" t="0" r="15059" b="0"/>
+          <a:stretch/>
+        </p:blipFill>
+        <p:spPr>
+          <a:xfrm>
+            <a:off x="5580000" y="3765600"/>
+            <a:ext cx="3599640" cy="2714400"/>
+          </a:xfrm>
+          <a:prstGeom prst="rect">
+            <a:avLst/>
+          </a:prstGeom>
+          <a:ln w="0">
+            <a:noFill/>
+          </a:ln>
+        </p:spPr>
+      </p:pic>
+      <p:pic>
+        <p:nvPicPr>
+          <p:cNvPr id="111" name="" descr=""/>
+          <p:cNvPicPr/>
+          <p:nvPr/>
+        </p:nvPicPr>
+        <p:blipFill>
+          <a:blip r:embed="rId9"/>
+          <a:stretch/>
+        </p:blipFill>
+        <p:spPr>
+          <a:xfrm>
+            <a:off x="9484200" y="4500000"/>
+            <a:ext cx="2575800" cy="1357920"/>
           </a:xfrm>
           <a:prstGeom prst="rect">
             <a:avLst/>
@@ -9113,21 +9613,21 @@
       </p:grpSpPr>
       <p:grpSp>
         <p:nvGrpSpPr>
-          <p:cNvPr id="107" name="Google Shape;266;g1f213c8c16b_0_ 2"/>
+          <p:cNvPr id="112" name="Google Shape;266;g1f213c8c16b_0_ 1"/>
           <p:cNvGrpSpPr/>
           <p:nvPr/>
         </p:nvGrpSpPr>
         <p:grpSpPr>
           <a:xfrm>
-            <a:off x="360" y="-17640"/>
+            <a:off x="0" y="0"/>
             <a:ext cx="12191040" cy="6856920"/>
-            <a:chOff x="360" y="-17640"/>
+            <a:chOff x="0" y="0"/>
             <a:chExt cx="12191040" cy="6856920"/>
           </a:xfrm>
         </p:grpSpPr>
         <p:pic>
           <p:nvPicPr>
-            <p:cNvPr id="108" name="Google Shape;267;g1f213c8c16b_0_ 2" descr=""/>
+            <p:cNvPr id="113" name="Google Shape;267;g1f213c8c16b_0_ 1" descr=""/>
             <p:cNvPicPr/>
             <p:nvPr/>
           </p:nvPicPr>
@@ -9138,7 +9638,7 @@
           </p:blipFill>
           <p:spPr>
             <a:xfrm>
-              <a:off x="360" y="-17640"/>
+              <a:off x="0" y="0"/>
               <a:ext cx="12191040" cy="6856920"/>
             </a:xfrm>
             <a:prstGeom prst="rect">
@@ -9151,7 +9651,7 @@
         </p:pic>
         <p:pic>
           <p:nvPicPr>
-            <p:cNvPr id="109" name="Google Shape;268;g1f213c8c16b_0_ 2" descr=""/>
+            <p:cNvPr id="114" name="Google Shape;268;g1f213c8c16b_0_ 1" descr=""/>
             <p:cNvPicPr/>
             <p:nvPr/>
           </p:nvPicPr>
@@ -9161,7 +9661,7 @@
           </p:blipFill>
           <p:spPr>
             <a:xfrm>
-              <a:off x="360" y="-17640"/>
+              <a:off x="0" y="0"/>
               <a:ext cx="12191040" cy="6856920"/>
             </a:xfrm>
             <a:prstGeom prst="rect">
@@ -9175,7 +9675,7 @@
       </p:grpSp>
       <p:pic>
         <p:nvPicPr>
-          <p:cNvPr id="110" name="Google Shape;269;g1f213c8c16b_0_ 2" descr=""/>
+          <p:cNvPr id="115" name="Google Shape;269;g1f213c8c16b_0_ 1" descr=""/>
           <p:cNvPicPr/>
           <p:nvPr/>
         </p:nvPicPr>
@@ -9198,7 +9698,7 @@
       </p:pic>
       <p:grpSp>
         <p:nvGrpSpPr>
-          <p:cNvPr id="111" name="Google Shape;287;g1f213c8c16b_0_ 2"/>
+          <p:cNvPr id="116" name="Google Shape;287;g1f213c8c16b_0_ 1"/>
           <p:cNvGrpSpPr/>
           <p:nvPr/>
         </p:nvGrpSpPr>
@@ -9212,7 +9712,7 @@
         </p:grpSpPr>
         <p:pic>
           <p:nvPicPr>
-            <p:cNvPr id="112" name="Google Shape;288;g1f213c8c16b_0_ 2" descr=""/>
+            <p:cNvPr id="117" name="Google Shape;288;g1f213c8c16b_0_ 1" descr=""/>
             <p:cNvPicPr/>
             <p:nvPr/>
           </p:nvPicPr>
@@ -9235,7 +9735,7 @@
         </p:pic>
         <p:pic>
           <p:nvPicPr>
-            <p:cNvPr id="113" name="Google Shape;289;g1f213c8c16b_0_ 2" descr=""/>
+            <p:cNvPr id="118" name="Google Shape;289;g1f213c8c16b_0_ 1" descr=""/>
             <p:cNvPicPr/>
             <p:nvPr/>
           </p:nvPicPr>
@@ -9259,7 +9759,7 @@
       </p:grpSp>
       <p:sp>
         <p:nvSpPr>
-          <p:cNvPr id="114" name="Google Shape;253;g1f213c8c16b_0_ 2"/>
+          <p:cNvPr id="119" name="Google Shape;253;g1f213c8c16b_0_ 1"/>
           <p:cNvSpPr/>
           <p:nvPr/>
         </p:nvSpPr>
@@ -9309,7 +9809,7 @@
                 <a:latin typeface="Nunito Sans Black"/>
                 <a:ea typeface="Nunito Sans Black"/>
               </a:rPr>
-              <a:t>Listas</a:t>
+              <a:t>Arreglos</a:t>
             </a:r>
             <a:endParaRPr b="0" lang="es-CO" sz="3600" spc="-1" strike="noStrike">
               <a:solidFill>
@@ -9322,7 +9822,7 @@
       </p:sp>
       <p:pic>
         <p:nvPicPr>
-          <p:cNvPr id="115" name="" descr=""/>
+          <p:cNvPr id="120" name="" descr=""/>
           <p:cNvPicPr/>
           <p:nvPr/>
         </p:nvPicPr>
@@ -9332,8 +9832,8 @@
         </p:blipFill>
         <p:spPr>
           <a:xfrm>
-            <a:off x="4243680" y="2020320"/>
-            <a:ext cx="3676320" cy="1399680"/>
+            <a:off x="3600000" y="1826280"/>
+            <a:ext cx="5543280" cy="4833720"/>
           </a:xfrm>
           <a:prstGeom prst="rect">
             <a:avLst/>
@@ -9343,29 +9843,156 @@
           </a:ln>
         </p:spPr>
       </p:pic>
-      <p:pic>
-        <p:nvPicPr>
-          <p:cNvPr id="116" name="" descr=""/>
-          <p:cNvPicPr/>
+      <p:sp>
+        <p:nvSpPr>
+          <p:cNvPr id="121" name=""/>
+          <p:cNvSpPr txBox="1"/>
           <p:nvPr/>
-        </p:nvPicPr>
-        <p:blipFill>
-          <a:blip r:embed="rId7"/>
-          <a:stretch/>
-        </p:blipFill>
-        <p:spPr>
-          <a:xfrm>
-            <a:off x="3509640" y="4092480"/>
-            <a:ext cx="5238360" cy="1847520"/>
-          </a:xfrm>
-          <a:prstGeom prst="rect">
-            <a:avLst/>
-          </a:prstGeom>
-          <a:ln w="0">
-            <a:noFill/>
-          </a:ln>
-        </p:spPr>
-      </p:pic>
+        </p:nvSpPr>
+        <p:spPr>
+          <a:xfrm>
+            <a:off x="180000" y="1620000"/>
+            <a:ext cx="2700000" cy="2649960"/>
+          </a:xfrm>
+          <a:prstGeom prst="rect">
+            <a:avLst/>
+          </a:prstGeom>
+          <a:noFill/>
+          <a:ln w="0">
+            <a:noFill/>
+          </a:ln>
+        </p:spPr>
+        <p:txBody>
+          <a:bodyPr lIns="90000" rIns="90000" tIns="45000" bIns="45000" anchor="t">
+            <a:noAutofit/>
+          </a:bodyPr>
+          <a:p>
+            <a:r>
+              <a:rPr b="0" lang="es-CO" sz="1800" spc="-1" strike="noStrike">
+                <a:solidFill>
+                  <a:srgbClr val="ffffd7"/>
+                </a:solidFill>
+                <a:latin typeface="Arial"/>
+              </a:rPr>
+              <a:t>Acceso:</a:t>
+            </a:r>
+            <a:endParaRPr b="0" lang="es-CO" sz="1800" spc="-1" strike="noStrike">
+              <a:solidFill>
+                <a:srgbClr val="000000"/>
+              </a:solidFill>
+              <a:latin typeface="Arial"/>
+            </a:endParaRPr>
+          </a:p>
+          <a:p>
+            <a:endParaRPr b="0" lang="es-CO" sz="1800" spc="-1" strike="noStrike">
+              <a:solidFill>
+                <a:srgbClr val="000000"/>
+              </a:solidFill>
+              <a:latin typeface="Arial"/>
+            </a:endParaRPr>
+          </a:p>
+          <a:p>
+            <a:r>
+              <a:rPr b="0" lang="es-CO" sz="1800" spc="-1" strike="noStrike">
+                <a:solidFill>
+                  <a:srgbClr val="ffffd7"/>
+                </a:solidFill>
+                <a:latin typeface="Arial"/>
+              </a:rPr>
+              <a:t>Array[indice]</a:t>
+            </a:r>
+            <a:endParaRPr b="0" lang="es-CO" sz="1800" spc="-1" strike="noStrike">
+              <a:solidFill>
+                <a:srgbClr val="000000"/>
+              </a:solidFill>
+              <a:latin typeface="Arial"/>
+            </a:endParaRPr>
+          </a:p>
+          <a:p>
+            <a:endParaRPr b="0" lang="es-CO" sz="1800" spc="-1" strike="noStrike">
+              <a:solidFill>
+                <a:srgbClr val="000000"/>
+              </a:solidFill>
+              <a:latin typeface="Arial"/>
+            </a:endParaRPr>
+          </a:p>
+          <a:p>
+            <a:r>
+              <a:rPr b="0" lang="es-CO" sz="1800" spc="-1" strike="noStrike">
+                <a:solidFill>
+                  <a:srgbClr val="ffffd7"/>
+                </a:solidFill>
+                <a:latin typeface="Arial"/>
+              </a:rPr>
+              <a:t>Eliminación.</a:t>
+            </a:r>
+            <a:endParaRPr b="0" lang="es-CO" sz="1800" spc="-1" strike="noStrike">
+              <a:solidFill>
+                <a:srgbClr val="000000"/>
+              </a:solidFill>
+              <a:latin typeface="Arial"/>
+            </a:endParaRPr>
+          </a:p>
+          <a:p>
+            <a:endParaRPr b="0" lang="es-CO" sz="1800" spc="-1" strike="noStrike">
+              <a:solidFill>
+                <a:srgbClr val="000000"/>
+              </a:solidFill>
+              <a:latin typeface="Arial"/>
+            </a:endParaRPr>
+          </a:p>
+          <a:p>
+            <a:r>
+              <a:rPr b="0" lang="es-CO" sz="1800" spc="-1" strike="noStrike">
+                <a:solidFill>
+                  <a:srgbClr val="ffffd7"/>
+                </a:solidFill>
+                <a:latin typeface="Arial"/>
+              </a:rPr>
+              <a:t>Actualización</a:t>
+            </a:r>
+            <a:endParaRPr b="0" lang="es-CO" sz="1800" spc="-1" strike="noStrike">
+              <a:solidFill>
+                <a:srgbClr val="000000"/>
+              </a:solidFill>
+              <a:latin typeface="Arial"/>
+            </a:endParaRPr>
+          </a:p>
+          <a:p>
+            <a:endParaRPr b="0" lang="es-CO" sz="1800" spc="-1" strike="noStrike">
+              <a:solidFill>
+                <a:srgbClr val="000000"/>
+              </a:solidFill>
+              <a:latin typeface="Arial"/>
+            </a:endParaRPr>
+          </a:p>
+          <a:p>
+            <a:r>
+              <a:rPr b="0" lang="es-CO" sz="1800" spc="-1" strike="noStrike">
+                <a:solidFill>
+                  <a:srgbClr val="ffffd7"/>
+                </a:solidFill>
+                <a:latin typeface="Arial"/>
+              </a:rPr>
+              <a:t>Array[indice] = valor</a:t>
+            </a:r>
+            <a:endParaRPr b="0" lang="es-CO" sz="1800" spc="-1" strike="noStrike">
+              <a:solidFill>
+                <a:srgbClr val="000000"/>
+              </a:solidFill>
+              <a:latin typeface="Arial"/>
+            </a:endParaRPr>
+          </a:p>
+          <a:p>
+            <a:endParaRPr b="0" lang="es-CO" sz="1800" spc="-1" strike="noStrike">
+              <a:solidFill>
+                <a:srgbClr val="000000"/>
+              </a:solidFill>
+              <a:latin typeface="Arial"/>
+            </a:endParaRPr>
+          </a:p>
+        </p:txBody>
+      </p:sp>
     </p:spTree>
   </p:cSld>
   <mc:AlternateContent>
@@ -9398,7 +10025,7 @@
       </p:grpSpPr>
       <p:grpSp>
         <p:nvGrpSpPr>
-          <p:cNvPr id="117" name="Google Shape;266;g1f213c8c16b_0_ 3"/>
+          <p:cNvPr id="122" name="Google Shape;266;g1f213c8c16b_0_ 2"/>
           <p:cNvGrpSpPr/>
           <p:nvPr/>
         </p:nvGrpSpPr>
@@ -9412,7 +10039,7 @@
         </p:grpSpPr>
         <p:pic>
           <p:nvPicPr>
-            <p:cNvPr id="118" name="Google Shape;267;g1f213c8c16b_0_ 3" descr=""/>
+            <p:cNvPr id="123" name="Google Shape;267;g1f213c8c16b_0_ 2" descr=""/>
             <p:cNvPicPr/>
             <p:nvPr/>
           </p:nvPicPr>
@@ -9436,7 +10063,7 @@
         </p:pic>
         <p:pic>
           <p:nvPicPr>
-            <p:cNvPr id="119" name="Google Shape;268;g1f213c8c16b_0_ 3" descr=""/>
+            <p:cNvPr id="124" name="Google Shape;268;g1f213c8c16b_0_ 2" descr=""/>
             <p:cNvPicPr/>
             <p:nvPr/>
           </p:nvPicPr>
@@ -9460,7 +10087,7 @@
       </p:grpSp>
       <p:pic>
         <p:nvPicPr>
-          <p:cNvPr id="120" name="Google Shape;269;g1f213c8c16b_0_ 3" descr=""/>
+          <p:cNvPr id="125" name="Google Shape;269;g1f213c8c16b_0_ 2" descr=""/>
           <p:cNvPicPr/>
           <p:nvPr/>
         </p:nvPicPr>
@@ -9483,7 +10110,7 @@
       </p:pic>
       <p:grpSp>
         <p:nvGrpSpPr>
-          <p:cNvPr id="121" name="Google Shape;287;g1f213c8c16b_0_ 3"/>
+          <p:cNvPr id="126" name="Google Shape;287;g1f213c8c16b_0_ 2"/>
           <p:cNvGrpSpPr/>
           <p:nvPr/>
         </p:nvGrpSpPr>
@@ -9497,7 +10124,7 @@
         </p:grpSpPr>
         <p:pic>
           <p:nvPicPr>
-            <p:cNvPr id="122" name="Google Shape;288;g1f213c8c16b_0_ 3" descr=""/>
+            <p:cNvPr id="127" name="Google Shape;288;g1f213c8c16b_0_ 2" descr=""/>
             <p:cNvPicPr/>
             <p:nvPr/>
           </p:nvPicPr>
@@ -9520,7 +10147,7 @@
         </p:pic>
         <p:pic>
           <p:nvPicPr>
-            <p:cNvPr id="123" name="Google Shape;289;g1f213c8c16b_0_ 3" descr=""/>
+            <p:cNvPr id="128" name="Google Shape;289;g1f213c8c16b_0_ 2" descr=""/>
             <p:cNvPicPr/>
             <p:nvPr/>
           </p:nvPicPr>
@@ -9544,7 +10171,7 @@
       </p:grpSp>
       <p:sp>
         <p:nvSpPr>
-          <p:cNvPr id="124" name="Google Shape;253;g1f213c8c16b_0_ 3"/>
+          <p:cNvPr id="129" name="Google Shape;253;g1f213c8c16b_0_ 2"/>
           <p:cNvSpPr/>
           <p:nvPr/>
         </p:nvSpPr>
@@ -9607,7 +10234,7 @@
       </p:sp>
       <p:pic>
         <p:nvPicPr>
-          <p:cNvPr id="125" name="" descr=""/>
+          <p:cNvPr id="130" name="" descr=""/>
           <p:cNvPicPr/>
           <p:nvPr/>
         </p:nvPicPr>
@@ -9630,7 +10257,7 @@
       </p:pic>
       <p:pic>
         <p:nvPicPr>
-          <p:cNvPr id="126" name="" descr=""/>
+          <p:cNvPr id="131" name="" descr=""/>
           <p:cNvPicPr/>
           <p:nvPr/>
         </p:nvPicPr>
@@ -9683,7 +10310,7 @@
       </p:grpSpPr>
       <p:grpSp>
         <p:nvGrpSpPr>
-          <p:cNvPr id="127" name="Google Shape;266;g1f213c8c16b_0_ 4"/>
+          <p:cNvPr id="132" name="Google Shape;266;g1f213c8c16b_0_ 3"/>
           <p:cNvGrpSpPr/>
           <p:nvPr/>
         </p:nvGrpSpPr>
@@ -9697,7 +10324,7 @@
         </p:grpSpPr>
         <p:pic>
           <p:nvPicPr>
-            <p:cNvPr id="128" name="Google Shape;267;g1f213c8c16b_0_ 4" descr=""/>
+            <p:cNvPr id="133" name="Google Shape;267;g1f213c8c16b_0_ 3" descr=""/>
             <p:cNvPicPr/>
             <p:nvPr/>
           </p:nvPicPr>
@@ -9721,7 +10348,7 @@
         </p:pic>
         <p:pic>
           <p:nvPicPr>
-            <p:cNvPr id="129" name="Google Shape;268;g1f213c8c16b_0_ 4" descr=""/>
+            <p:cNvPr id="134" name="Google Shape;268;g1f213c8c16b_0_ 3" descr=""/>
             <p:cNvPicPr/>
             <p:nvPr/>
           </p:nvPicPr>
@@ -9745,7 +10372,7 @@
       </p:grpSp>
       <p:pic>
         <p:nvPicPr>
-          <p:cNvPr id="130" name="Google Shape;269;g1f213c8c16b_0_ 4" descr=""/>
+          <p:cNvPr id="135" name="Google Shape;269;g1f213c8c16b_0_ 3" descr=""/>
           <p:cNvPicPr/>
           <p:nvPr/>
         </p:nvPicPr>
@@ -9768,7 +10395,7 @@
       </p:pic>
       <p:grpSp>
         <p:nvGrpSpPr>
-          <p:cNvPr id="131" name="Google Shape;287;g1f213c8c16b_0_ 4"/>
+          <p:cNvPr id="136" name="Google Shape;287;g1f213c8c16b_0_ 3"/>
           <p:cNvGrpSpPr/>
           <p:nvPr/>
         </p:nvGrpSpPr>
@@ -9782,7 +10409,7 @@
         </p:grpSpPr>
         <p:pic>
           <p:nvPicPr>
-            <p:cNvPr id="132" name="Google Shape;288;g1f213c8c16b_0_ 4" descr=""/>
+            <p:cNvPr id="137" name="Google Shape;288;g1f213c8c16b_0_ 3" descr=""/>
             <p:cNvPicPr/>
             <p:nvPr/>
           </p:nvPicPr>
@@ -9805,7 +10432,7 @@
         </p:pic>
         <p:pic>
           <p:nvPicPr>
-            <p:cNvPr id="133" name="Google Shape;289;g1f213c8c16b_0_ 4" descr=""/>
+            <p:cNvPr id="138" name="Google Shape;289;g1f213c8c16b_0_ 3" descr=""/>
             <p:cNvPicPr/>
             <p:nvPr/>
           </p:nvPicPr>
@@ -9829,7 +10456,7 @@
       </p:grpSp>
       <p:sp>
         <p:nvSpPr>
-          <p:cNvPr id="134" name="Google Shape;253;g1f213c8c16b_0_ 5"/>
+          <p:cNvPr id="139" name="Google Shape;253;g1f213c8c16b_0_ 3"/>
           <p:cNvSpPr/>
           <p:nvPr/>
         </p:nvSpPr>
@@ -9879,7 +10506,7 @@
                 <a:latin typeface="Nunito Sans Black"/>
                 <a:ea typeface="Nunito Sans Black"/>
               </a:rPr>
-              <a:t>Pilas</a:t>
+              <a:t>Listas</a:t>
             </a:r>
             <a:endParaRPr b="0" lang="es-CO" sz="3600" spc="-1" strike="noStrike">
               <a:solidFill>
@@ -9892,7 +10519,7 @@
       </p:sp>
       <p:pic>
         <p:nvPicPr>
-          <p:cNvPr id="135" name="" descr=""/>
+          <p:cNvPr id="140" name="" descr=""/>
           <p:cNvPicPr/>
           <p:nvPr/>
         </p:nvPicPr>
@@ -9902,8 +10529,31 @@
         </p:blipFill>
         <p:spPr>
           <a:xfrm>
-            <a:off x="2327040" y="1709280"/>
-            <a:ext cx="7752960" cy="4590720"/>
+            <a:off x="4243680" y="2020320"/>
+            <a:ext cx="3676320" cy="1399680"/>
+          </a:xfrm>
+          <a:prstGeom prst="rect">
+            <a:avLst/>
+          </a:prstGeom>
+          <a:ln w="0">
+            <a:noFill/>
+          </a:ln>
+        </p:spPr>
+      </p:pic>
+      <p:pic>
+        <p:nvPicPr>
+          <p:cNvPr id="141" name="" descr=""/>
+          <p:cNvPicPr/>
+          <p:nvPr/>
+        </p:nvPicPr>
+        <p:blipFill>
+          <a:blip r:embed="rId7"/>
+          <a:stretch/>
+        </p:blipFill>
+        <p:spPr>
+          <a:xfrm>
+            <a:off x="3509640" y="4092480"/>
+            <a:ext cx="5238360" cy="1847520"/>
           </a:xfrm>
           <a:prstGeom prst="rect">
             <a:avLst/>
@@ -9945,7 +10595,7 @@
       </p:grpSpPr>
       <p:grpSp>
         <p:nvGrpSpPr>
-          <p:cNvPr id="136" name="Google Shape;266;g1f213c8c16b_0_ 6"/>
+          <p:cNvPr id="142" name="Google Shape;266;g1f213c8c16b_0_ 4"/>
           <p:cNvGrpSpPr/>
           <p:nvPr/>
         </p:nvGrpSpPr>
@@ -9959,7 +10609,7 @@
         </p:grpSpPr>
         <p:pic>
           <p:nvPicPr>
-            <p:cNvPr id="137" name="Google Shape;267;g1f213c8c16b_0_ 6" descr=""/>
+            <p:cNvPr id="143" name="Google Shape;267;g1f213c8c16b_0_ 4" descr=""/>
             <p:cNvPicPr/>
             <p:nvPr/>
           </p:nvPicPr>
@@ -9983,7 +10633,7 @@
         </p:pic>
         <p:pic>
           <p:nvPicPr>
-            <p:cNvPr id="138" name="Google Shape;268;g1f213c8c16b_0_ 6" descr=""/>
+            <p:cNvPr id="144" name="Google Shape;268;g1f213c8c16b_0_ 4" descr=""/>
             <p:cNvPicPr/>
             <p:nvPr/>
           </p:nvPicPr>
@@ -10007,7 +10657,7 @@
       </p:grpSp>
       <p:pic>
         <p:nvPicPr>
-          <p:cNvPr id="139" name="Google Shape;269;g1f213c8c16b_0_ 6" descr=""/>
+          <p:cNvPr id="145" name="Google Shape;269;g1f213c8c16b_0_ 4" descr=""/>
           <p:cNvPicPr/>
           <p:nvPr/>
         </p:nvPicPr>
@@ -10030,7 +10680,7 @@
       </p:pic>
       <p:grpSp>
         <p:nvGrpSpPr>
-          <p:cNvPr id="140" name="Google Shape;287;g1f213c8c16b_0_ 6"/>
+          <p:cNvPr id="146" name="Google Shape;287;g1f213c8c16b_0_ 4"/>
           <p:cNvGrpSpPr/>
           <p:nvPr/>
         </p:nvGrpSpPr>
@@ -10044,7 +10694,7 @@
         </p:grpSpPr>
         <p:pic>
           <p:nvPicPr>
-            <p:cNvPr id="141" name="Google Shape;288;g1f213c8c16b_0_ 6" descr=""/>
+            <p:cNvPr id="147" name="Google Shape;288;g1f213c8c16b_0_ 4" descr=""/>
             <p:cNvPicPr/>
             <p:nvPr/>
           </p:nvPicPr>
@@ -10067,7 +10717,7 @@
         </p:pic>
         <p:pic>
           <p:nvPicPr>
-            <p:cNvPr id="142" name="Google Shape;289;g1f213c8c16b_0_ 6" descr=""/>
+            <p:cNvPr id="148" name="Google Shape;289;g1f213c8c16b_0_ 4" descr=""/>
             <p:cNvPicPr/>
             <p:nvPr/>
           </p:nvPicPr>
@@ -10091,7 +10741,7 @@
       </p:grpSp>
       <p:sp>
         <p:nvSpPr>
-          <p:cNvPr id="143" name="Google Shape;253;g1f213c8c16b_0_ 6"/>
+          <p:cNvPr id="149" name="Google Shape;253;g1f213c8c16b_0_ 5"/>
           <p:cNvSpPr/>
           <p:nvPr/>
         </p:nvSpPr>
@@ -10141,7 +10791,7 @@
                 <a:latin typeface="Nunito Sans Black"/>
                 <a:ea typeface="Nunito Sans Black"/>
               </a:rPr>
-              <a:t>Colas</a:t>
+              <a:t>Pilas</a:t>
             </a:r>
             <a:endParaRPr b="0" lang="es-CO" sz="3600" spc="-1" strike="noStrike">
               <a:solidFill>
@@ -10154,7 +10804,7 @@
       </p:sp>
       <p:pic>
         <p:nvPicPr>
-          <p:cNvPr id="144" name="" descr=""/>
+          <p:cNvPr id="150" name="" descr=""/>
           <p:cNvPicPr/>
           <p:nvPr/>
         </p:nvPicPr>
@@ -10164,8 +10814,8 @@
         </p:blipFill>
         <p:spPr>
           <a:xfrm>
-            <a:off x="1361880" y="1888200"/>
-            <a:ext cx="9534240" cy="4771800"/>
+            <a:off x="2327040" y="1709280"/>
+            <a:ext cx="7752960" cy="4590720"/>
           </a:xfrm>
           <a:prstGeom prst="rect">
             <a:avLst/>
@@ -10175,6 +10825,48 @@
           </a:ln>
         </p:spPr>
       </p:pic>
+      <p:sp>
+        <p:nvSpPr>
+          <p:cNvPr id="151" name=""/>
+          <p:cNvSpPr txBox="1"/>
+          <p:nvPr/>
+        </p:nvSpPr>
+        <p:spPr>
+          <a:xfrm>
+            <a:off x="1260000" y="1440000"/>
+            <a:ext cx="2340000" cy="900000"/>
+          </a:xfrm>
+          <a:prstGeom prst="rect">
+            <a:avLst/>
+          </a:prstGeom>
+          <a:noFill/>
+          <a:ln w="0">
+            <a:noFill/>
+          </a:ln>
+        </p:spPr>
+        <p:txBody>
+          <a:bodyPr lIns="90000" rIns="90000" tIns="45000" bIns="45000" anchor="t">
+            <a:noAutofit/>
+          </a:bodyPr>
+          <a:p>
+            <a:r>
+              <a:rPr b="0" lang="es-CO" sz="1800" spc="-1" strike="noStrike">
+                <a:solidFill>
+                  <a:srgbClr val="ffffd7"/>
+                </a:solidFill>
+                <a:latin typeface="Arial"/>
+              </a:rPr>
+              <a:t>L.I.F.O. Last In First Out</a:t>
+            </a:r>
+            <a:endParaRPr b="0" lang="es-CO" sz="1800" spc="-1" strike="noStrike">
+              <a:solidFill>
+                <a:srgbClr val="ffffd7"/>
+              </a:solidFill>
+              <a:latin typeface="Arial"/>
+            </a:endParaRPr>
+          </a:p>
+        </p:txBody>
+      </p:sp>
     </p:spTree>
   </p:cSld>
   <mc:AlternateContent>
@@ -10205,113 +10897,71 @@
           <a:chExt cx="0" cy="0"/>
         </a:xfrm>
       </p:grpSpPr>
+      <p:grpSp>
+        <p:nvGrpSpPr>
+          <p:cNvPr id="152" name="Google Shape;266;g1f213c8c16b_0_ 6"/>
+          <p:cNvGrpSpPr/>
+          <p:nvPr/>
+        </p:nvGrpSpPr>
+        <p:grpSpPr>
+          <a:xfrm>
+            <a:off x="360" y="-17640"/>
+            <a:ext cx="12191040" cy="6856920"/>
+            <a:chOff x="360" y="-17640"/>
+            <a:chExt cx="12191040" cy="6856920"/>
+          </a:xfrm>
+        </p:grpSpPr>
+        <p:pic>
+          <p:nvPicPr>
+            <p:cNvPr id="153" name="Google Shape;267;g1f213c8c16b_0_ 6" descr=""/>
+            <p:cNvPicPr/>
+            <p:nvPr/>
+          </p:nvPicPr>
+          <p:blipFill>
+            <a:blip r:embed="rId1"/>
+            <a:srcRect l="7813" t="0" r="7813" b="7535"/>
+            <a:stretch/>
+          </p:blipFill>
+          <p:spPr>
+            <a:xfrm>
+              <a:off x="360" y="-17640"/>
+              <a:ext cx="12191040" cy="6856920"/>
+            </a:xfrm>
+            <a:prstGeom prst="rect">
+              <a:avLst/>
+            </a:prstGeom>
+            <a:ln w="0">
+              <a:noFill/>
+            </a:ln>
+          </p:spPr>
+        </p:pic>
+        <p:pic>
+          <p:nvPicPr>
+            <p:cNvPr id="154" name="Google Shape;268;g1f213c8c16b_0_ 6" descr=""/>
+            <p:cNvPicPr/>
+            <p:nvPr/>
+          </p:nvPicPr>
+          <p:blipFill>
+            <a:blip r:embed="rId2"/>
+            <a:stretch/>
+          </p:blipFill>
+          <p:spPr>
+            <a:xfrm>
+              <a:off x="360" y="-17640"/>
+              <a:ext cx="12191040" cy="6856920"/>
+            </a:xfrm>
+            <a:prstGeom prst="rect">
+              <a:avLst/>
+            </a:prstGeom>
+            <a:ln w="0">
+              <a:noFill/>
+            </a:ln>
+          </p:spPr>
+        </p:pic>
+      </p:grpSp>
       <p:pic>
         <p:nvPicPr>
-          <p:cNvPr id="145" name="Google Shape;311;g1f213c8c16b_0_211" descr=""/>
-          <p:cNvPicPr/>
-          <p:nvPr/>
-        </p:nvPicPr>
-        <p:blipFill>
-          <a:blip r:embed="rId1"/>
-          <a:stretch/>
-        </p:blipFill>
-        <p:spPr>
-          <a:xfrm>
-            <a:off x="3965040" y="4641120"/>
-            <a:ext cx="4088880" cy="1336320"/>
-          </a:xfrm>
-          <a:prstGeom prst="rect">
-            <a:avLst/>
-          </a:prstGeom>
-          <a:ln w="0">
-            <a:noFill/>
-          </a:ln>
-        </p:spPr>
-      </p:pic>
-      <p:sp>
-        <p:nvSpPr>
-          <p:cNvPr id="146" name="Google Shape;312;g1f213c8c16b_0_211"/>
-          <p:cNvSpPr/>
-          <p:nvPr/>
-        </p:nvSpPr>
-        <p:spPr>
-          <a:xfrm>
-            <a:off x="1228680" y="585000"/>
-            <a:ext cx="9565560" cy="1186920"/>
-          </a:xfrm>
-          <a:prstGeom prst="rect">
-            <a:avLst/>
-          </a:prstGeom>
-          <a:noFill/>
-          <a:ln w="0">
-            <a:noFill/>
-          </a:ln>
-        </p:spPr>
-        <p:style>
-          <a:lnRef idx="0"/>
-          <a:fillRef idx="0"/>
-          <a:effectRef idx="0"/>
-          <a:fontRef idx="minor"/>
-        </p:style>
-        <p:txBody>
-          <a:bodyPr lIns="90000" rIns="90000" tIns="45000" bIns="45000" anchor="t">
-            <a:spAutoFit/>
-          </a:bodyPr>
-          <a:p>
-            <a:pPr algn="ctr">
-              <a:lnSpc>
-                <a:spcPct val="100000"/>
-              </a:lnSpc>
-              <a:tabLst>
-                <a:tab algn="l" pos="0"/>
-              </a:tabLst>
-            </a:pPr>
-            <a:r>
-              <a:rPr b="0" lang="es-CO" sz="7200" spc="-1" strike="noStrike">
-                <a:solidFill>
-                  <a:srgbClr val="001059"/>
-                </a:solidFill>
-                <a:latin typeface="Nunito Sans Black"/>
-                <a:ea typeface="Nunito Sans Black"/>
-              </a:rPr>
-              <a:t>LOGOS:</a:t>
-            </a:r>
-            <a:endParaRPr b="0" lang="es-CO" sz="7200" spc="-1" strike="noStrike">
-              <a:solidFill>
-                <a:srgbClr val="000000"/>
-              </a:solidFill>
-              <a:latin typeface="Arial"/>
-            </a:endParaRPr>
-          </a:p>
-        </p:txBody>
-      </p:sp>
-      <p:pic>
-        <p:nvPicPr>
-          <p:cNvPr id="147" name="Google Shape;313;g1f213c8c16b_0_211" descr=""/>
-          <p:cNvPicPr/>
-          <p:nvPr/>
-        </p:nvPicPr>
-        <p:blipFill>
-          <a:blip r:embed="rId2"/>
-          <a:srcRect l="8004" t="20494" r="6931" b="16482"/>
-          <a:stretch/>
-        </p:blipFill>
-        <p:spPr>
-          <a:xfrm>
-            <a:off x="4869360" y="2808000"/>
-            <a:ext cx="2451960" cy="870480"/>
-          </a:xfrm>
-          <a:prstGeom prst="rect">
-            <a:avLst/>
-          </a:prstGeom>
-          <a:ln w="0">
-            <a:noFill/>
-          </a:ln>
-        </p:spPr>
-      </p:pic>
-      <p:pic>
-        <p:nvPicPr>
-          <p:cNvPr id="148" name="Google Shape;314;g1f213c8c16b_0_211" descr=""/>
+          <p:cNvPr id="155" name="Google Shape;269;g1f213c8c16b_0_ 6" descr=""/>
           <p:cNvPicPr/>
           <p:nvPr/>
         </p:nvPicPr>
@@ -10321,8 +10971,8 @@
         </p:blipFill>
         <p:spPr>
           <a:xfrm>
-            <a:off x="1228680" y="2808000"/>
-            <a:ext cx="1854000" cy="645480"/>
+            <a:off x="4815360" y="165600"/>
+            <a:ext cx="2338200" cy="1119600"/>
           </a:xfrm>
           <a:prstGeom prst="rect">
             <a:avLst/>
@@ -10332,55 +10982,133 @@
           </a:ln>
         </p:spPr>
       </p:pic>
+      <p:grpSp>
+        <p:nvGrpSpPr>
+          <p:cNvPr id="156" name="Google Shape;287;g1f213c8c16b_0_ 6"/>
+          <p:cNvGrpSpPr/>
+          <p:nvPr/>
+        </p:nvGrpSpPr>
+        <p:grpSpPr>
+          <a:xfrm>
+            <a:off x="626400" y="254520"/>
+            <a:ext cx="11250360" cy="982080"/>
+            <a:chOff x="626400" y="254520"/>
+            <a:chExt cx="11250360" cy="982080"/>
+          </a:xfrm>
+        </p:grpSpPr>
+        <p:pic>
+          <p:nvPicPr>
+            <p:cNvPr id="157" name="Google Shape;288;g1f213c8c16b_0_ 6" descr=""/>
+            <p:cNvPicPr/>
+            <p:nvPr/>
+          </p:nvPicPr>
+          <p:blipFill>
+            <a:blip r:embed="rId4"/>
+            <a:stretch/>
+          </p:blipFill>
+          <p:spPr>
+            <a:xfrm>
+              <a:off x="10059840" y="254520"/>
+              <a:ext cx="1816920" cy="982080"/>
+            </a:xfrm>
+            <a:prstGeom prst="rect">
+              <a:avLst/>
+            </a:prstGeom>
+            <a:ln w="0">
+              <a:noFill/>
+            </a:ln>
+          </p:spPr>
+        </p:pic>
+        <p:pic>
+          <p:nvPicPr>
+            <p:cNvPr id="158" name="Google Shape;289;g1f213c8c16b_0_ 6" descr=""/>
+            <p:cNvPicPr/>
+            <p:nvPr/>
+          </p:nvPicPr>
+          <p:blipFill>
+            <a:blip r:embed="rId5"/>
+            <a:stretch/>
+          </p:blipFill>
+          <p:spPr>
+            <a:xfrm>
+              <a:off x="626400" y="484200"/>
+              <a:ext cx="1504800" cy="523440"/>
+            </a:xfrm>
+            <a:prstGeom prst="rect">
+              <a:avLst/>
+            </a:prstGeom>
+            <a:ln w="0">
+              <a:noFill/>
+            </a:ln>
+          </p:spPr>
+        </p:pic>
+      </p:grpSp>
+      <p:sp>
+        <p:nvSpPr>
+          <p:cNvPr id="159" name="Google Shape;253;g1f213c8c16b_0_ 6"/>
+          <p:cNvSpPr/>
+          <p:nvPr/>
+        </p:nvSpPr>
+        <p:spPr>
+          <a:xfrm>
+            <a:off x="1440000" y="1080000"/>
+            <a:ext cx="9360000" cy="639000"/>
+          </a:xfrm>
+          <a:prstGeom prst="rect">
+            <a:avLst/>
+          </a:prstGeom>
+          <a:noFill/>
+          <a:ln w="0">
+            <a:noFill/>
+          </a:ln>
+        </p:spPr>
+        <p:style>
+          <a:lnRef idx="0"/>
+          <a:fillRef idx="0"/>
+          <a:effectRef idx="0"/>
+          <a:fontRef idx="minor"/>
+        </p:style>
+        <p:txBody>
+          <a:bodyPr lIns="90000" rIns="90000" tIns="45000" bIns="45000" anchor="t">
+            <a:spAutoFit/>
+          </a:bodyPr>
+          <a:p>
+            <a:pPr algn="ctr">
+              <a:lnSpc>
+                <a:spcPct val="100000"/>
+              </a:lnSpc>
+              <a:spcBef>
+                <a:spcPts val="1191"/>
+              </a:spcBef>
+              <a:spcAft>
+                <a:spcPts val="992"/>
+              </a:spcAft>
+              <a:tabLst>
+                <a:tab algn="l" pos="0"/>
+              </a:tabLst>
+            </a:pPr>
+            <a:r>
+              <a:rPr b="0" lang="es-CO" sz="3600" spc="-1" strike="noStrike">
+                <a:solidFill>
+                  <a:schemeClr val="lt1"/>
+                </a:solidFill>
+                <a:latin typeface="Nunito Sans Black"/>
+                <a:ea typeface="Nunito Sans Black"/>
+              </a:rPr>
+              <a:t>Colas</a:t>
+            </a:r>
+            <a:endParaRPr b="0" lang="es-CO" sz="3600" spc="-1" strike="noStrike">
+              <a:solidFill>
+                <a:srgbClr val="000000"/>
+              </a:solidFill>
+              <a:latin typeface="Arial"/>
+            </a:endParaRPr>
+          </a:p>
+        </p:txBody>
+      </p:sp>
       <p:pic>
         <p:nvPicPr>
-          <p:cNvPr id="149" name="Google Shape;315;g1f213c8c16b_0_211" descr=""/>
-          <p:cNvPicPr/>
-          <p:nvPr/>
-        </p:nvPicPr>
-        <p:blipFill>
-          <a:blip r:embed="rId4"/>
-          <a:stretch/>
-        </p:blipFill>
-        <p:spPr>
-          <a:xfrm>
-            <a:off x="8579880" y="2695680"/>
-            <a:ext cx="2026440" cy="1095480"/>
-          </a:xfrm>
-          <a:prstGeom prst="rect">
-            <a:avLst/>
-          </a:prstGeom>
-          <a:ln w="0">
-            <a:noFill/>
-          </a:ln>
-        </p:spPr>
-      </p:pic>
-      <p:pic>
-        <p:nvPicPr>
-          <p:cNvPr id="150" name="Google Shape;316;g1f213c8c16b_0_211" descr=""/>
-          <p:cNvPicPr/>
-          <p:nvPr/>
-        </p:nvPicPr>
-        <p:blipFill>
-          <a:blip r:embed="rId5"/>
-          <a:stretch/>
-        </p:blipFill>
-        <p:spPr>
-          <a:xfrm>
-            <a:off x="597600" y="398520"/>
-            <a:ext cx="1086840" cy="378360"/>
-          </a:xfrm>
-          <a:prstGeom prst="rect">
-            <a:avLst/>
-          </a:prstGeom>
-          <a:ln w="0">
-            <a:noFill/>
-          </a:ln>
-        </p:spPr>
-      </p:pic>
-      <p:pic>
-        <p:nvPicPr>
-          <p:cNvPr id="151" name="Google Shape;317;g1f213c8c16b_0_211" descr=""/>
+          <p:cNvPr id="160" name="" descr=""/>
           <p:cNvPicPr/>
           <p:nvPr/>
         </p:nvPicPr>
@@ -10390,8 +11118,8 @@
         </p:blipFill>
         <p:spPr>
           <a:xfrm>
-            <a:off x="10002240" y="199800"/>
-            <a:ext cx="1423080" cy="768960"/>
+            <a:off x="1361880" y="1888200"/>
+            <a:ext cx="9534240" cy="4771800"/>
           </a:xfrm>
           <a:prstGeom prst="rect">
             <a:avLst/>
@@ -10401,6 +11129,48 @@
           </a:ln>
         </p:spPr>
       </p:pic>
+      <p:sp>
+        <p:nvSpPr>
+          <p:cNvPr id="161" name=""/>
+          <p:cNvSpPr txBox="1"/>
+          <p:nvPr/>
+        </p:nvSpPr>
+        <p:spPr>
+          <a:xfrm>
+            <a:off x="1271880" y="1232280"/>
+            <a:ext cx="3948120" cy="486720"/>
+          </a:xfrm>
+          <a:prstGeom prst="rect">
+            <a:avLst/>
+          </a:prstGeom>
+          <a:noFill/>
+          <a:ln w="0">
+            <a:noFill/>
+          </a:ln>
+        </p:spPr>
+        <p:txBody>
+          <a:bodyPr wrap="none" lIns="90000" rIns="90000" tIns="45000" bIns="45000" anchor="t">
+            <a:noAutofit/>
+          </a:bodyPr>
+          <a:p>
+            <a:r>
+              <a:rPr b="0" lang="es-CO" sz="2800" spc="-1" strike="noStrike">
+                <a:solidFill>
+                  <a:srgbClr val="ffffd7"/>
+                </a:solidFill>
+                <a:latin typeface="Arial"/>
+              </a:rPr>
+              <a:t>F.I.F.O. First In First Out</a:t>
+            </a:r>
+            <a:endParaRPr b="0" lang="es-CO" sz="2800" spc="-1" strike="noStrike">
+              <a:solidFill>
+                <a:srgbClr val="000000"/>
+              </a:solidFill>
+              <a:latin typeface="Arial"/>
+            </a:endParaRPr>
+          </a:p>
+        </p:txBody>
+      </p:sp>
     </p:spTree>
   </p:cSld>
   <mc:AlternateContent>

</xml_diff>

<commit_message>
Modulo 2 - Clase 3
</commit_message>
<xml_diff>
--- a/Material pedagógico/Modulo 2/Clase 1/Clase 1 - Modulo 2.pptx
+++ b/Material pedagógico/Modulo 2/Clase 1/Clase 1 - Modulo 2.pptx
@@ -359,7 +359,7 @@
             <a:pPr indent="0" algn="r">
               <a:buNone/>
             </a:pPr>
-            <a:fld id="{57DF7B41-DE90-4F5B-B4D0-CFED80A4ABC4}" type="slidenum">
+            <a:fld id="{090238D1-BD97-4B89-9B60-C972B3209084}" type="slidenum">
               <a:rPr b="0" lang="es-CO" sz="1400" spc="-1" strike="noStrike">
                 <a:solidFill>
                   <a:srgbClr val="000000"/>
@@ -517,7 +517,7 @@
                 <a:tab algn="l" pos="0"/>
               </a:tabLst>
             </a:pPr>
-            <a:fld id="{0DABAF05-C2E9-47B3-A14C-AB4347B725C1}" type="slidenum">
+            <a:fld id="{9173F3BF-3F02-4128-B9E0-652ED223A169}" type="slidenum">
               <a:rPr b="0" lang="es-CO" sz="1400" spc="-1" strike="noStrike">
                 <a:solidFill>
                   <a:srgbClr val="000000"/>
@@ -674,7 +674,7 @@
                 <a:tab algn="l" pos="0"/>
               </a:tabLst>
             </a:pPr>
-            <a:fld id="{5DF76063-8976-4AE0-838E-E4E3297892F8}" type="slidenum">
+            <a:fld id="{2BF9A65C-75ED-4CBD-9D87-5E9886EDE33E}" type="slidenum">
               <a:rPr b="0" lang="es-CO" sz="1400" spc="-1" strike="noStrike">
                 <a:solidFill>
                   <a:srgbClr val="000000"/>
@@ -831,7 +831,7 @@
                 <a:tab algn="l" pos="0"/>
               </a:tabLst>
             </a:pPr>
-            <a:fld id="{610D7CEF-12E1-487D-96EE-14DD5F91103C}" type="slidenum">
+            <a:fld id="{87EEFDA9-CBE0-4E4D-9797-C097ABDA108C}" type="slidenum">
               <a:rPr b="0" lang="es-CO" sz="1400" spc="-1" strike="noStrike">
                 <a:solidFill>
                   <a:srgbClr val="000000"/>
@@ -988,7 +988,7 @@
                 <a:tab algn="l" pos="0"/>
               </a:tabLst>
             </a:pPr>
-            <a:fld id="{7F9B781E-2A62-4CE7-9C77-D25A87D38E35}" type="slidenum">
+            <a:fld id="{D03260CF-BB07-4F8C-9FD7-829B64D8C60C}" type="slidenum">
               <a:rPr b="0" lang="es-CO" sz="1400" spc="-1" strike="noStrike">
                 <a:solidFill>
                   <a:srgbClr val="000000"/>
@@ -1145,7 +1145,7 @@
                 <a:tab algn="l" pos="0"/>
               </a:tabLst>
             </a:pPr>
-            <a:fld id="{1D652712-F87A-4653-B808-B1E807C298EC}" type="slidenum">
+            <a:fld id="{055D672E-06E2-4EDE-A923-154B5B2097B1}" type="slidenum">
               <a:rPr b="0" lang="es-CO" sz="1400" spc="-1" strike="noStrike">
                 <a:solidFill>
                   <a:srgbClr val="000000"/>
@@ -1302,7 +1302,7 @@
                 <a:tab algn="l" pos="0"/>
               </a:tabLst>
             </a:pPr>
-            <a:fld id="{EC041AD6-582E-425E-9C3F-200DAF196BA3}" type="slidenum">
+            <a:fld id="{3ACB61E8-1513-4787-AC38-A15A923F3B8A}" type="slidenum">
               <a:rPr b="0" lang="es-CO" sz="1400" spc="-1" strike="noStrike">
                 <a:solidFill>
                   <a:srgbClr val="000000"/>
@@ -1459,7 +1459,7 @@
                 <a:tab algn="l" pos="0"/>
               </a:tabLst>
             </a:pPr>
-            <a:fld id="{2D8D9F4D-5E67-415C-A90D-11153AF599C7}" type="slidenum">
+            <a:fld id="{6EBFAA25-E8BA-4AC6-9AD5-4A06D1DAB7FA}" type="slidenum">
               <a:rPr b="0" lang="es-CO" sz="1400" spc="-1" strike="noStrike">
                 <a:solidFill>
                   <a:srgbClr val="000000"/>
@@ -1616,7 +1616,7 @@
                 <a:tab algn="l" pos="0"/>
               </a:tabLst>
             </a:pPr>
-            <a:fld id="{7B92ED31-474A-416D-9287-0C5ADD3AA5AB}" type="slidenum">
+            <a:fld id="{61CC15C1-C065-40B8-BA65-C884EE8CC818}" type="slidenum">
               <a:rPr b="0" lang="es-CO" sz="1400" spc="-1" strike="noStrike">
                 <a:solidFill>
                   <a:srgbClr val="000000"/>
@@ -1773,7 +1773,7 @@
                 <a:tab algn="l" pos="0"/>
               </a:tabLst>
             </a:pPr>
-            <a:fld id="{67337724-4CB9-4781-A69C-956280418808}" type="slidenum">
+            <a:fld id="{D3B8A30B-35F4-481C-BDE7-B7CD2989C92A}" type="slidenum">
               <a:rPr b="0" lang="es-CO" sz="1400" spc="-1" strike="noStrike">
                 <a:solidFill>
                   <a:srgbClr val="000000"/>
@@ -1930,7 +1930,7 @@
                 <a:tab algn="l" pos="0"/>
               </a:tabLst>
             </a:pPr>
-            <a:fld id="{D272727B-EAA2-418B-A3FF-F04F0FBED056}" type="slidenum">
+            <a:fld id="{F98DB905-4D97-4233-A11D-E10EAA2C1F06}" type="slidenum">
               <a:rPr b="0" lang="es-CO" sz="1400" spc="-1" strike="noStrike">
                 <a:solidFill>
                   <a:srgbClr val="000000"/>
@@ -2087,7 +2087,7 @@
                 <a:tab algn="l" pos="0"/>
               </a:tabLst>
             </a:pPr>
-            <a:fld id="{806E8D42-03F2-472D-9345-C50EEC9356F9}" type="slidenum">
+            <a:fld id="{8EE3446F-2204-4C1E-80BB-D2828ABAE929}" type="slidenum">
               <a:rPr b="0" lang="es-CO" sz="1400" spc="-1" strike="noStrike">
                 <a:solidFill>
                   <a:srgbClr val="000000"/>
@@ -2161,7 +2161,7 @@
         <p:txBody>
           <a:bodyPr/>
           <a:p>
-            <a:fld id="{8993EF01-9608-4900-A41B-34593B83B9B4}" type="slidenum">
+            <a:fld id="{9DE3BA44-C2CD-45EC-B7B7-440CD555532E}" type="slidenum">
               <a:t>&lt;#&gt;</a:t>
             </a:fld>
           </a:p>
@@ -2244,7 +2244,7 @@
         <p:txBody>
           <a:bodyPr/>
           <a:p>
-            <a:fld id="{F66F502A-211A-4E2C-926E-CD3D5444C15D}" type="slidenum">
+            <a:fld id="{432A7F5A-1034-4EB2-AA07-6AB01E6AAE44}" type="slidenum">
               <a:t>&lt;#&gt;</a:t>
             </a:fld>
           </a:p>
@@ -2327,7 +2327,7 @@
         <p:txBody>
           <a:bodyPr/>
           <a:p>
-            <a:fld id="{F2F57C31-1622-44C2-8161-611455DBFFB4}" type="slidenum">
+            <a:fld id="{EC80835B-487E-4936-84E4-6A46CCAE578C}" type="slidenum">
               <a:t>&lt;#&gt;</a:t>
             </a:fld>
           </a:p>
@@ -2410,7 +2410,7 @@
         <p:txBody>
           <a:bodyPr/>
           <a:p>
-            <a:fld id="{B5E3851E-1298-4A4B-866F-6AD38F82831E}" type="slidenum">
+            <a:fld id="{B2F962B9-D4E8-4ACE-B982-626DA51F5485}" type="slidenum">
               <a:t>&lt;#&gt;</a:t>
             </a:fld>
           </a:p>
@@ -2493,7 +2493,7 @@
         <p:txBody>
           <a:bodyPr/>
           <a:p>
-            <a:fld id="{26F6425E-79E7-41CD-90D8-8D7F820A7AA8}" type="slidenum">
+            <a:fld id="{1AE01F1B-FA2C-4DE4-9ADA-532CFF19BBE8}" type="slidenum">
               <a:t>&lt;#&gt;</a:t>
             </a:fld>
           </a:p>
@@ -2656,7 +2656,7 @@
         <p:txBody>
           <a:bodyPr/>
           <a:p>
-            <a:fld id="{87ED350A-E1E1-4604-B31A-4F7B2446CBA9}" type="slidenum">
+            <a:fld id="{1A5F5C7B-1C1F-4BCF-87E2-3BEAC7E5EBD6}" type="slidenum">
               <a:t>&lt;#&gt;</a:t>
             </a:fld>
           </a:p>
@@ -2822,7 +2822,7 @@
         <p:txBody>
           <a:bodyPr/>
           <a:p>
-            <a:fld id="{F4503CDC-5541-44A8-8383-D3B4EEB0E859}" type="slidenum">
+            <a:fld id="{53464DB6-9C79-4A47-AD65-59DCBD2BA605}" type="slidenum">
               <a:t>&lt;#&gt;</a:t>
             </a:fld>
           </a:p>
@@ -2905,7 +2905,7 @@
         <p:txBody>
           <a:bodyPr/>
           <a:p>
-            <a:fld id="{E47B7DCB-7ECA-48E4-AE49-2821785C0D59}" type="slidenum">
+            <a:fld id="{645EF0F5-820C-4253-9D68-90F7B758701C}" type="slidenum">
               <a:t>&lt;#&gt;</a:t>
             </a:fld>
           </a:p>
@@ -3114,7 +3114,7 @@
         <p:txBody>
           <a:bodyPr/>
           <a:p>
-            <a:fld id="{83D5FC4B-1EFA-4B6D-AF42-3E779F660759}" type="slidenum">
+            <a:fld id="{BC63145B-91D3-46BB-A612-6DCA20493411}" type="slidenum">
               <a:t>&lt;#&gt;</a:t>
             </a:fld>
           </a:p>
@@ -3197,7 +3197,7 @@
         <p:txBody>
           <a:bodyPr/>
           <a:p>
-            <a:fld id="{3023625F-BC69-4554-A466-4C7B56A4E020}" type="slidenum">
+            <a:fld id="{DD07A95C-9E8E-4926-B347-93AC5591C7FF}" type="slidenum">
               <a:t>&lt;#&gt;</a:t>
             </a:fld>
           </a:p>
@@ -3320,7 +3320,7 @@
         <p:txBody>
           <a:bodyPr/>
           <a:p>
-            <a:fld id="{5E5BF2AF-6180-4DF1-A05F-F40D55EF40F3}" type="slidenum">
+            <a:fld id="{CD902728-93F2-44C9-8846-B7479ABD7D75}" type="slidenum">
               <a:t>&lt;#&gt;</a:t>
             </a:fld>
           </a:p>
@@ -3437,7 +3437,7 @@
                 </a:solidFill>
                 <a:latin typeface="Times New Roman"/>
               </a:rPr>
-              <a:t> </a:t>
+              <a:t>&lt;pie de página&gt;</a:t>
             </a:r>
             <a:endParaRPr b="0" lang="es-CO" sz="1400" spc="-1" strike="noStrike">
               <a:solidFill>
@@ -3503,7 +3503,7 @@
                 <a:tab algn="l" pos="0"/>
               </a:tabLst>
             </a:pPr>
-            <a:fld id="{C991C93C-24B6-48CE-A514-98CB3F4BCD04}" type="slidenum">
+            <a:fld id="{E87F63E2-E55B-4092-9CFE-7EA9730C924C}" type="slidenum">
               <a:rPr b="0" lang="es-CO" sz="1200" spc="-1" strike="noStrike">
                 <a:solidFill>
                   <a:srgbClr val="888888"/>
@@ -3511,7 +3511,7 @@
                 <a:latin typeface="Calibri"/>
                 <a:ea typeface="Calibri"/>
               </a:rPr>
-              <a:t>5</a:t>
+              <a:t>&lt;número&gt;</a:t>
             </a:fld>
             <a:endParaRPr b="0" lang="es-CO" sz="1200" spc="-1" strike="noStrike">
               <a:solidFill>
@@ -3571,7 +3571,7 @@
                 </a:solidFill>
                 <a:latin typeface="Times New Roman"/>
               </a:rPr>
-              <a:t> </a:t>
+              <a:t>&lt;fecha/hora&gt;</a:t>
             </a:r>
             <a:endParaRPr b="0" lang="es-CO" sz="1400" spc="-1" strike="noStrike">
               <a:solidFill>
@@ -4016,7 +4016,7 @@
                 <a:tab algn="l" pos="0"/>
               </a:tabLst>
             </a:pPr>
-            <a:fld id="{B89DE66E-3746-4B3D-8C2D-E9ACC21A67A6}" type="slidenum">
+            <a:fld id="{0FBA9E75-1446-4F77-BA71-700E0F544671}" type="slidenum">
               <a:rPr b="0" lang="es-CO" sz="1200" spc="-1" strike="noStrike">
                 <a:solidFill>
                   <a:srgbClr val="888888"/>
@@ -4255,7 +4255,7 @@
                 <a:tab algn="l" pos="0"/>
               </a:tabLst>
             </a:pPr>
-            <a:fld id="{B5612DD2-8552-472E-87D7-3F2FFAB1AF53}" type="slidenum">
+            <a:fld id="{D713267C-A669-43D7-AFD2-78DD3F5118BE}" type="slidenum">
               <a:rPr b="0" lang="es-CO" sz="1200" spc="-1" strike="noStrike">
                 <a:solidFill>
                   <a:srgbClr val="888888"/>
@@ -4494,7 +4494,7 @@
                 <a:tab algn="l" pos="0"/>
               </a:tabLst>
             </a:pPr>
-            <a:fld id="{A1FC82FA-E681-4BC0-AFB5-86B4F61D7076}" type="slidenum">
+            <a:fld id="{DB86FAF9-18B3-48DC-8A4A-3EE640D6B70D}" type="slidenum">
               <a:rPr b="0" lang="es-CO" sz="1200" spc="-1" strike="noStrike">
                 <a:solidFill>
                   <a:srgbClr val="888888"/>
@@ -4733,7 +4733,7 @@
                 <a:tab algn="l" pos="0"/>
               </a:tabLst>
             </a:pPr>
-            <a:fld id="{A8E59B3F-418F-4A09-8B5E-973BDC8BC40B}" type="slidenum">
+            <a:fld id="{0A6AFC02-FE53-48F8-BBB6-49EAFA63534F}" type="slidenum">
               <a:rPr b="0" lang="es-CO" sz="1200" spc="-1" strike="noStrike">
                 <a:solidFill>
                   <a:srgbClr val="888888"/>
@@ -5021,7 +5021,7 @@
                 <a:tab algn="l" pos="0"/>
               </a:tabLst>
             </a:pPr>
-            <a:fld id="{94D635D1-C794-4FF3-B431-C5C5BCF1CFA8}" type="slidenum">
+            <a:fld id="{EC2355DF-2018-415D-A728-F1E22512E138}" type="slidenum">
               <a:rPr b="0" lang="es-CO" sz="1200" spc="-1" strike="noStrike">
                 <a:solidFill>
                   <a:srgbClr val="888888"/>
@@ -5534,7 +5534,7 @@
                 <a:tab algn="l" pos="0"/>
               </a:tabLst>
             </a:pPr>
-            <a:fld id="{F1107CC5-B637-4E53-80D0-7782F573F7CA}" type="slidenum">
+            <a:fld id="{161D015F-0A83-4738-9B13-389048A64E8D}" type="slidenum">
               <a:rPr b="0" lang="es-CO" sz="1200" spc="-1" strike="noStrike">
                 <a:solidFill>
                   <a:srgbClr val="888888"/>
@@ -5773,7 +5773,7 @@
                 <a:tab algn="l" pos="0"/>
               </a:tabLst>
             </a:pPr>
-            <a:fld id="{4E44F962-3AC3-4E65-A590-F913934F94E3}" type="slidenum">
+            <a:fld id="{9EC2C2F7-635E-4778-AA0E-FE68832B8270}" type="slidenum">
               <a:rPr b="0" lang="es-CO" sz="1200" spc="-1" strike="noStrike">
                 <a:solidFill>
                   <a:srgbClr val="888888"/>
@@ -6511,7 +6511,7 @@
                 <a:tab algn="l" pos="0"/>
               </a:tabLst>
             </a:pPr>
-            <a:fld id="{94E4934E-93E1-41A0-BC8A-45936C60B35A}" type="slidenum">
+            <a:fld id="{49A745FB-0D16-4053-9A67-824649619CEF}" type="slidenum">
               <a:rPr b="0" lang="es-CO" sz="1200" spc="-1" strike="noStrike">
                 <a:solidFill>
                   <a:srgbClr val="888888"/>
@@ -6750,7 +6750,7 @@
                 <a:tab algn="l" pos="0"/>
               </a:tabLst>
             </a:pPr>
-            <a:fld id="{65811042-FCBB-4B13-BC7A-8F78BA6EFC8B}" type="slidenum">
+            <a:fld id="{73423D18-9E18-4EE2-9B8C-D38277929C68}" type="slidenum">
               <a:rPr b="0" lang="es-CO" sz="1200" spc="-1" strike="noStrike">
                 <a:solidFill>
                   <a:srgbClr val="888888"/>
@@ -7038,7 +7038,7 @@
                 <a:tab algn="l" pos="0"/>
               </a:tabLst>
             </a:pPr>
-            <a:fld id="{EFD6984E-61EC-48E4-8A50-CBEA75ECE032}" type="slidenum">
+            <a:fld id="{D4B4826A-B0CC-4C6E-A073-2EEBBBB35E29}" type="slidenum">
               <a:rPr b="0" lang="es-CO" sz="1200" spc="-1" strike="noStrike">
                 <a:solidFill>
                   <a:srgbClr val="888888"/>
@@ -9851,7 +9851,7 @@
         </p:nvSpPr>
         <p:spPr>
           <a:xfrm>
-            <a:off x="180000" y="1620000"/>
+            <a:off x="360000" y="2570040"/>
             <a:ext cx="2700000" cy="2649960"/>
           </a:xfrm>
           <a:prstGeom prst="rect">

</xml_diff>